<commit_message>
Att Apresentação ppt v2.0
</commit_message>
<xml_diff>
--- a/documentacao/Pro Eagle apresentação.pptx
+++ b/documentacao/Pro Eagle apresentação.pptx
@@ -7,7 +7,10 @@
   <p:sldIdLst>
     <p:sldId id="256" r:id="rId2"/>
     <p:sldId id="257" r:id="rId3"/>
-    <p:sldId id="258" r:id="rId4"/>
+    <p:sldId id="261" r:id="rId4"/>
+    <p:sldId id="260" r:id="rId5"/>
+    <p:sldId id="258" r:id="rId6"/>
+    <p:sldId id="259" r:id="rId7"/>
   </p:sldIdLst>
   <p:sldSz cx="12192000" cy="6858000"/>
   <p:notesSz cx="6858000" cy="9144000"/>
@@ -106,6 +109,11 @@
       </a:defRPr>
     </a:lvl9pPr>
   </p:defaultTextStyle>
+  <p:extLst>
+    <p:ext uri="{EFAFB233-063F-42B5-8137-9DF3F51BA10A}">
+      <p15:sldGuideLst xmlns:p15="http://schemas.microsoft.com/office/powerpoint/2012/main"/>
+    </p:ext>
+  </p:extLst>
 </p:presentation>
 </file>
 
@@ -3997,59 +4005,14 @@
           <a:lstStyle/>
           <a:p>
             <a:r>
-              <a:rPr lang="pt-BR" sz="4000" dirty="0" err="1">
-                <a:solidFill>
-                  <a:schemeClr val="bg1"/>
-                </a:solidFill>
-                <a:latin typeface="POLYA Regular" panose="00000500000000000000" pitchFamily="50" charset="0"/>
-              </a:rPr>
-              <a:t>Contextualizaçao</a:t>
-            </a:r>
-            <a:endParaRPr lang="pt-BR" sz="4000" dirty="0">
-              <a:solidFill>
-                <a:schemeClr val="bg1"/>
-              </a:solidFill>
-              <a:latin typeface="POLYA Regular" panose="00000500000000000000" pitchFamily="50" charset="0"/>
-            </a:endParaRPr>
-          </a:p>
-        </p:txBody>
-      </p:sp>
-      <p:sp>
-        <p:nvSpPr>
-          <p:cNvPr id="9" name="Retângulo 8">
-            <a:extLst>
-              <a:ext uri="{FF2B5EF4-FFF2-40B4-BE49-F238E27FC236}">
-                <a16:creationId xmlns:a16="http://schemas.microsoft.com/office/drawing/2014/main" id="{660FB423-E8D4-4176-A4F4-56EEE405654A}"/>
-              </a:ext>
-            </a:extLst>
-          </p:cNvPr>
-          <p:cNvSpPr/>
-          <p:nvPr/>
-        </p:nvSpPr>
-        <p:spPr>
-          <a:xfrm>
-            <a:off x="9712481" y="1748191"/>
-            <a:ext cx="514885" cy="769441"/>
-          </a:xfrm>
-          <a:prstGeom prst="rect">
-            <a:avLst/>
-          </a:prstGeom>
-        </p:spPr>
-        <p:txBody>
-          <a:bodyPr wrap="none">
-            <a:spAutoFit/>
-          </a:bodyPr>
-          <a:lstStyle/>
-          <a:p>
-            <a:r>
-              <a:rPr lang="pt-BR" sz="4400" dirty="0">
-                <a:solidFill>
-                  <a:schemeClr val="bg1"/>
-                </a:solidFill>
-                <a:latin typeface="Arial" panose="020B0604020202020204" pitchFamily="34" charset="0"/>
-                <a:cs typeface="Arial" panose="020B0604020202020204" pitchFamily="34" charset="0"/>
-              </a:rPr>
-              <a:t>~</a:t>
+              <a:rPr lang="pt-BR" sz="4000" b="1" dirty="0">
+                <a:solidFill>
+                  <a:schemeClr val="bg1"/>
+                </a:solidFill>
+                <a:latin typeface="Arial" panose="020B0604020202020204" pitchFamily="34" charset="0"/>
+                <a:cs typeface="Arial" panose="020B0604020202020204" pitchFamily="34" charset="0"/>
+              </a:rPr>
+              <a:t>CONTEXTUALIZAÇÃO</a:t>
             </a:r>
           </a:p>
         </p:txBody>
@@ -5262,6 +5225,2349 @@
         </p:nvSpPr>
         <p:spPr>
           <a:xfrm>
+            <a:off x="0" y="0"/>
+            <a:ext cx="12192001" cy="6858000"/>
+          </a:xfrm>
+          <a:prstGeom prst="rect">
+            <a:avLst/>
+          </a:prstGeom>
+          <a:solidFill>
+            <a:schemeClr val="tx2">
+              <a:lumMod val="50000"/>
+            </a:schemeClr>
+          </a:solidFill>
+          <a:ln>
+            <a:noFill/>
+          </a:ln>
+        </p:spPr>
+        <p:style>
+          <a:lnRef idx="2">
+            <a:schemeClr val="accent1">
+              <a:shade val="50000"/>
+            </a:schemeClr>
+          </a:lnRef>
+          <a:fillRef idx="1">
+            <a:schemeClr val="accent1"/>
+          </a:fillRef>
+          <a:effectRef idx="0">
+            <a:schemeClr val="accent1"/>
+          </a:effectRef>
+          <a:fontRef idx="minor">
+            <a:schemeClr val="lt1"/>
+          </a:fontRef>
+        </p:style>
+        <p:txBody>
+          <a:bodyPr rtlCol="0" anchor="ctr"/>
+          <a:lstStyle/>
+          <a:p>
+            <a:endParaRPr lang="pt-BR" b="1" dirty="0">
+              <a:solidFill>
+                <a:schemeClr val="bg1"/>
+              </a:solidFill>
+              <a:latin typeface="Arial" panose="020B0604020202020204" pitchFamily="34" charset="0"/>
+              <a:cs typeface="Arial" panose="020B0604020202020204" pitchFamily="34" charset="0"/>
+            </a:endParaRPr>
+          </a:p>
+        </p:txBody>
+      </p:sp>
+      <p:sp>
+        <p:nvSpPr>
+          <p:cNvPr id="5" name="CaixaDeTexto 4">
+            <a:extLst>
+              <a:ext uri="{FF2B5EF4-FFF2-40B4-BE49-F238E27FC236}">
+                <a16:creationId xmlns:a16="http://schemas.microsoft.com/office/drawing/2014/main" id="{9D0108FE-3AE4-4C97-BAEA-C9907C60FA98}"/>
+              </a:ext>
+            </a:extLst>
+          </p:cNvPr>
+          <p:cNvSpPr txBox="1"/>
+          <p:nvPr/>
+        </p:nvSpPr>
+        <p:spPr>
+          <a:xfrm>
+            <a:off x="238539" y="54993"/>
+            <a:ext cx="5857461" cy="707886"/>
+          </a:xfrm>
+          <a:prstGeom prst="rect">
+            <a:avLst/>
+          </a:prstGeom>
+          <a:noFill/>
+        </p:spPr>
+        <p:txBody>
+          <a:bodyPr wrap="square" rtlCol="0">
+            <a:spAutoFit/>
+          </a:bodyPr>
+          <a:lstStyle/>
+          <a:p>
+            <a:r>
+              <a:rPr lang="pt-BR" sz="4000" b="1" dirty="0">
+                <a:solidFill>
+                  <a:schemeClr val="bg1"/>
+                </a:solidFill>
+                <a:latin typeface="Arial" panose="020B0604020202020204" pitchFamily="34" charset="0"/>
+                <a:cs typeface="Arial" panose="020B0604020202020204" pitchFamily="34" charset="0"/>
+              </a:rPr>
+              <a:t>PROTO PERSONA</a:t>
+            </a:r>
+          </a:p>
+        </p:txBody>
+      </p:sp>
+      <p:sp>
+        <p:nvSpPr>
+          <p:cNvPr id="15" name="Retângulo 14">
+            <a:extLst>
+              <a:ext uri="{FF2B5EF4-FFF2-40B4-BE49-F238E27FC236}">
+                <a16:creationId xmlns:a16="http://schemas.microsoft.com/office/drawing/2014/main" id="{1F878B66-142E-490A-8E45-3D187F0CAE54}"/>
+              </a:ext>
+            </a:extLst>
+          </p:cNvPr>
+          <p:cNvSpPr/>
+          <p:nvPr/>
+        </p:nvSpPr>
+        <p:spPr>
+          <a:xfrm>
+            <a:off x="11211340" y="168566"/>
+            <a:ext cx="741347" cy="83226"/>
+          </a:xfrm>
+          <a:prstGeom prst="rect">
+            <a:avLst/>
+          </a:prstGeom>
+          <a:solidFill>
+            <a:srgbClr val="00B0F0"/>
+          </a:solidFill>
+          <a:ln w="38100">
+            <a:solidFill>
+              <a:srgbClr val="00B0F0"/>
+            </a:solidFill>
+          </a:ln>
+          <a:effectLst/>
+        </p:spPr>
+        <p:style>
+          <a:lnRef idx="2">
+            <a:schemeClr val="accent1">
+              <a:shade val="50000"/>
+            </a:schemeClr>
+          </a:lnRef>
+          <a:fillRef idx="1">
+            <a:schemeClr val="accent1"/>
+          </a:fillRef>
+          <a:effectRef idx="0">
+            <a:schemeClr val="accent1"/>
+          </a:effectRef>
+          <a:fontRef idx="minor">
+            <a:schemeClr val="lt1"/>
+          </a:fontRef>
+        </p:style>
+        <p:txBody>
+          <a:bodyPr rtlCol="0" anchor="ctr"/>
+          <a:lstStyle/>
+          <a:p>
+            <a:pPr algn="ctr"/>
+            <a:endParaRPr lang="pt-BR"/>
+          </a:p>
+        </p:txBody>
+      </p:sp>
+      <p:sp>
+        <p:nvSpPr>
+          <p:cNvPr id="6" name="Retângulo 5">
+            <a:extLst>
+              <a:ext uri="{FF2B5EF4-FFF2-40B4-BE49-F238E27FC236}">
+                <a16:creationId xmlns:a16="http://schemas.microsoft.com/office/drawing/2014/main" id="{7E952A03-8E7C-44F3-9469-5F847EA7B5D4}"/>
+              </a:ext>
+            </a:extLst>
+          </p:cNvPr>
+          <p:cNvSpPr/>
+          <p:nvPr/>
+        </p:nvSpPr>
+        <p:spPr>
+          <a:xfrm>
+            <a:off x="344557" y="762879"/>
+            <a:ext cx="5645426" cy="2747084"/>
+          </a:xfrm>
+          <a:prstGeom prst="rect">
+            <a:avLst/>
+          </a:prstGeom>
+          <a:noFill/>
+          <a:ln w="25400"/>
+        </p:spPr>
+        <p:style>
+          <a:lnRef idx="2">
+            <a:schemeClr val="accent1">
+              <a:shade val="50000"/>
+            </a:schemeClr>
+          </a:lnRef>
+          <a:fillRef idx="1">
+            <a:schemeClr val="accent1"/>
+          </a:fillRef>
+          <a:effectRef idx="0">
+            <a:schemeClr val="accent1"/>
+          </a:effectRef>
+          <a:fontRef idx="minor">
+            <a:schemeClr val="lt1"/>
+          </a:fontRef>
+        </p:style>
+        <p:txBody>
+          <a:bodyPr rtlCol="0" anchor="ctr"/>
+          <a:lstStyle/>
+          <a:p>
+            <a:pPr algn="ctr"/>
+            <a:endParaRPr lang="pt-BR"/>
+          </a:p>
+        </p:txBody>
+      </p:sp>
+      <p:sp>
+        <p:nvSpPr>
+          <p:cNvPr id="14" name="Retângulo 13">
+            <a:extLst>
+              <a:ext uri="{FF2B5EF4-FFF2-40B4-BE49-F238E27FC236}">
+                <a16:creationId xmlns:a16="http://schemas.microsoft.com/office/drawing/2014/main" id="{F0B43630-125B-4CEC-A8DE-BEC963D93F8C}"/>
+              </a:ext>
+            </a:extLst>
+          </p:cNvPr>
+          <p:cNvSpPr/>
+          <p:nvPr/>
+        </p:nvSpPr>
+        <p:spPr>
+          <a:xfrm>
+            <a:off x="6202018" y="762879"/>
+            <a:ext cx="5741504" cy="2747084"/>
+          </a:xfrm>
+          <a:prstGeom prst="rect">
+            <a:avLst/>
+          </a:prstGeom>
+          <a:noFill/>
+          <a:ln w="25400"/>
+        </p:spPr>
+        <p:style>
+          <a:lnRef idx="2">
+            <a:schemeClr val="accent1">
+              <a:shade val="50000"/>
+            </a:schemeClr>
+          </a:lnRef>
+          <a:fillRef idx="1">
+            <a:schemeClr val="accent1"/>
+          </a:fillRef>
+          <a:effectRef idx="0">
+            <a:schemeClr val="accent1"/>
+          </a:effectRef>
+          <a:fontRef idx="minor">
+            <a:schemeClr val="lt1"/>
+          </a:fontRef>
+        </p:style>
+        <p:txBody>
+          <a:bodyPr rtlCol="0" anchor="ctr"/>
+          <a:lstStyle/>
+          <a:p>
+            <a:pPr algn="ctr"/>
+            <a:endParaRPr lang="pt-BR"/>
+          </a:p>
+        </p:txBody>
+      </p:sp>
+      <p:sp>
+        <p:nvSpPr>
+          <p:cNvPr id="16" name="Retângulo 15">
+            <a:extLst>
+              <a:ext uri="{FF2B5EF4-FFF2-40B4-BE49-F238E27FC236}">
+                <a16:creationId xmlns:a16="http://schemas.microsoft.com/office/drawing/2014/main" id="{A1BD8CB5-2A4B-415C-8EBC-1B45DE7D75DD}"/>
+              </a:ext>
+            </a:extLst>
+          </p:cNvPr>
+          <p:cNvSpPr/>
+          <p:nvPr/>
+        </p:nvSpPr>
+        <p:spPr>
+          <a:xfrm>
+            <a:off x="344556" y="3790053"/>
+            <a:ext cx="11598965" cy="2747084"/>
+          </a:xfrm>
+          <a:prstGeom prst="rect">
+            <a:avLst/>
+          </a:prstGeom>
+          <a:noFill/>
+          <a:ln w="25400"/>
+        </p:spPr>
+        <p:style>
+          <a:lnRef idx="2">
+            <a:schemeClr val="accent1">
+              <a:shade val="50000"/>
+            </a:schemeClr>
+          </a:lnRef>
+          <a:fillRef idx="1">
+            <a:schemeClr val="accent1"/>
+          </a:fillRef>
+          <a:effectRef idx="0">
+            <a:schemeClr val="accent1"/>
+          </a:effectRef>
+          <a:fontRef idx="minor">
+            <a:schemeClr val="lt1"/>
+          </a:fontRef>
+        </p:style>
+        <p:txBody>
+          <a:bodyPr rtlCol="0" anchor="ctr"/>
+          <a:lstStyle/>
+          <a:p>
+            <a:pPr algn="ctr"/>
+            <a:endParaRPr lang="pt-BR" dirty="0"/>
+          </a:p>
+        </p:txBody>
+      </p:sp>
+      <p:pic>
+        <p:nvPicPr>
+          <p:cNvPr id="18" name="Imagem 17" descr="Homem de terno e gravata&#10;&#10;Descrição gerada automaticamente">
+            <a:extLst>
+              <a:ext uri="{FF2B5EF4-FFF2-40B4-BE49-F238E27FC236}">
+                <a16:creationId xmlns:a16="http://schemas.microsoft.com/office/drawing/2014/main" id="{5BA3E9A1-6FAC-431B-9D80-25CA4D3F760D}"/>
+              </a:ext>
+            </a:extLst>
+          </p:cNvPr>
+          <p:cNvPicPr>
+            <a:picLocks noChangeAspect="1"/>
+          </p:cNvPicPr>
+          <p:nvPr/>
+        </p:nvPicPr>
+        <p:blipFill>
+          <a:blip r:embed="rId2">
+            <a:extLst>
+              <a:ext uri="{28A0092B-C50C-407E-A947-70E740481C1C}">
+                <a14:useLocalDpi xmlns:a14="http://schemas.microsoft.com/office/drawing/2010/main" val="0"/>
+              </a:ext>
+            </a:extLst>
+          </a:blip>
+          <a:stretch>
+            <a:fillRect/>
+          </a:stretch>
+        </p:blipFill>
+        <p:spPr>
+          <a:xfrm>
+            <a:off x="2434866" y="1321422"/>
+            <a:ext cx="1464806" cy="1457739"/>
+          </a:xfrm>
+          <a:prstGeom prst="ellipse">
+            <a:avLst/>
+          </a:prstGeom>
+          <a:ln w="63500" cap="rnd">
+            <a:noFill/>
+          </a:ln>
+          <a:effectLst/>
+          <a:scene3d>
+            <a:camera prst="orthographicFront"/>
+            <a:lightRig rig="contrasting" dir="t">
+              <a:rot lat="0" lon="0" rev="3000000"/>
+            </a:lightRig>
+          </a:scene3d>
+          <a:sp3d contourW="7620">
+            <a:bevelT w="95250" h="31750"/>
+            <a:contourClr>
+              <a:srgbClr val="333333"/>
+            </a:contourClr>
+          </a:sp3d>
+        </p:spPr>
+      </p:pic>
+      <p:sp>
+        <p:nvSpPr>
+          <p:cNvPr id="7" name="Retângulo 6">
+            <a:extLst>
+              <a:ext uri="{FF2B5EF4-FFF2-40B4-BE49-F238E27FC236}">
+                <a16:creationId xmlns:a16="http://schemas.microsoft.com/office/drawing/2014/main" id="{8FCFBB2E-6CF7-4777-AC7F-F6772CF3EFA2}"/>
+              </a:ext>
+            </a:extLst>
+          </p:cNvPr>
+          <p:cNvSpPr/>
+          <p:nvPr/>
+        </p:nvSpPr>
+        <p:spPr>
+          <a:xfrm>
+            <a:off x="344556" y="766228"/>
+            <a:ext cx="869149" cy="369332"/>
+          </a:xfrm>
+          <a:prstGeom prst="rect">
+            <a:avLst/>
+          </a:prstGeom>
+          <a:noFill/>
+        </p:spPr>
+        <p:txBody>
+          <a:bodyPr wrap="none">
+            <a:spAutoFit/>
+          </a:bodyPr>
+          <a:lstStyle/>
+          <a:p>
+            <a:r>
+              <a:rPr lang="pt-BR" b="1" dirty="0">
+                <a:solidFill>
+                  <a:schemeClr val="bg1"/>
+                </a:solidFill>
+              </a:rPr>
+              <a:t>Quem?</a:t>
+            </a:r>
+          </a:p>
+        </p:txBody>
+      </p:sp>
+      <p:sp>
+        <p:nvSpPr>
+          <p:cNvPr id="10" name="Retângulo 9">
+            <a:extLst>
+              <a:ext uri="{FF2B5EF4-FFF2-40B4-BE49-F238E27FC236}">
+                <a16:creationId xmlns:a16="http://schemas.microsoft.com/office/drawing/2014/main" id="{96CE19A2-FEF3-44A8-85E8-5F9CF46FD6D7}"/>
+              </a:ext>
+            </a:extLst>
+          </p:cNvPr>
+          <p:cNvSpPr/>
+          <p:nvPr/>
+        </p:nvSpPr>
+        <p:spPr>
+          <a:xfrm>
+            <a:off x="6202018" y="750478"/>
+            <a:ext cx="2760756" cy="369332"/>
+          </a:xfrm>
+          <a:prstGeom prst="rect">
+            <a:avLst/>
+          </a:prstGeom>
+        </p:spPr>
+        <p:txBody>
+          <a:bodyPr wrap="none">
+            <a:spAutoFit/>
+          </a:bodyPr>
+          <a:lstStyle/>
+          <a:p>
+            <a:r>
+              <a:rPr lang="pt-BR" b="1" dirty="0">
+                <a:solidFill>
+                  <a:schemeClr val="bg1"/>
+                </a:solidFill>
+              </a:rPr>
+              <a:t>Informações/componentes</a:t>
+            </a:r>
+          </a:p>
+        </p:txBody>
+      </p:sp>
+      <p:sp>
+        <p:nvSpPr>
+          <p:cNvPr id="11" name="Retângulo 10">
+            <a:extLst>
+              <a:ext uri="{FF2B5EF4-FFF2-40B4-BE49-F238E27FC236}">
+                <a16:creationId xmlns:a16="http://schemas.microsoft.com/office/drawing/2014/main" id="{E657AA0D-17E3-46F9-9A30-F536C077B5FF}"/>
+              </a:ext>
+            </a:extLst>
+          </p:cNvPr>
+          <p:cNvSpPr/>
+          <p:nvPr/>
+        </p:nvSpPr>
+        <p:spPr>
+          <a:xfrm>
+            <a:off x="2352559" y="2967176"/>
+            <a:ext cx="1629420" cy="369332"/>
+          </a:xfrm>
+          <a:prstGeom prst="rect">
+            <a:avLst/>
+          </a:prstGeom>
+        </p:spPr>
+        <p:txBody>
+          <a:bodyPr wrap="none">
+            <a:spAutoFit/>
+          </a:bodyPr>
+          <a:lstStyle/>
+          <a:p>
+            <a:pPr algn="ctr"/>
+            <a:r>
+              <a:rPr lang="pt-BR" b="1" dirty="0">
+                <a:solidFill>
+                  <a:schemeClr val="bg1"/>
+                </a:solidFill>
+              </a:rPr>
+              <a:t>Antônio Inácio </a:t>
+            </a:r>
+          </a:p>
+        </p:txBody>
+      </p:sp>
+      <p:sp>
+        <p:nvSpPr>
+          <p:cNvPr id="12" name="Retângulo 11">
+            <a:extLst>
+              <a:ext uri="{FF2B5EF4-FFF2-40B4-BE49-F238E27FC236}">
+                <a16:creationId xmlns:a16="http://schemas.microsoft.com/office/drawing/2014/main" id="{43A6D2A6-1951-4073-A158-5172D645B570}"/>
+              </a:ext>
+            </a:extLst>
+          </p:cNvPr>
+          <p:cNvSpPr/>
+          <p:nvPr/>
+        </p:nvSpPr>
+        <p:spPr>
+          <a:xfrm>
+            <a:off x="344556" y="3780299"/>
+            <a:ext cx="2217915" cy="369332"/>
+          </a:xfrm>
+          <a:prstGeom prst="rect">
+            <a:avLst/>
+          </a:prstGeom>
+        </p:spPr>
+        <p:txBody>
+          <a:bodyPr wrap="none">
+            <a:spAutoFit/>
+          </a:bodyPr>
+          <a:lstStyle/>
+          <a:p>
+            <a:r>
+              <a:rPr lang="pt-BR" b="1" dirty="0">
+                <a:solidFill>
+                  <a:schemeClr val="bg1"/>
+                </a:solidFill>
+              </a:rPr>
+              <a:t>Dores e necessidades</a:t>
+            </a:r>
+          </a:p>
+        </p:txBody>
+      </p:sp>
+      <p:sp>
+        <p:nvSpPr>
+          <p:cNvPr id="19" name="Retângulo 18">
+            <a:extLst>
+              <a:ext uri="{FF2B5EF4-FFF2-40B4-BE49-F238E27FC236}">
+                <a16:creationId xmlns:a16="http://schemas.microsoft.com/office/drawing/2014/main" id="{8D854E9E-1CE8-4960-B2DB-4699D7EE8F2D}"/>
+              </a:ext>
+            </a:extLst>
+          </p:cNvPr>
+          <p:cNvSpPr/>
+          <p:nvPr/>
+        </p:nvSpPr>
+        <p:spPr>
+          <a:xfrm>
+            <a:off x="6292141" y="1307825"/>
+            <a:ext cx="6096000" cy="2031325"/>
+          </a:xfrm>
+          <a:prstGeom prst="rect">
+            <a:avLst/>
+          </a:prstGeom>
+        </p:spPr>
+        <p:txBody>
+          <a:bodyPr>
+            <a:spAutoFit/>
+          </a:bodyPr>
+          <a:lstStyle/>
+          <a:p>
+            <a:pPr marL="285750" indent="-285750">
+              <a:buFont typeface="Arial" panose="020B0604020202020204" pitchFamily="34" charset="0"/>
+              <a:buChar char="•"/>
+            </a:pPr>
+            <a:r>
+              <a:rPr lang="pt-BR" dirty="0">
+                <a:solidFill>
+                  <a:schemeClr val="bg1"/>
+                </a:solidFill>
+              </a:rPr>
+              <a:t>35 – 65 (Normalmente não importa)</a:t>
+            </a:r>
+          </a:p>
+          <a:p>
+            <a:pPr marL="285750" indent="-285750">
+              <a:buFont typeface="Arial" panose="020B0604020202020204" pitchFamily="34" charset="0"/>
+              <a:buChar char="•"/>
+            </a:pPr>
+            <a:r>
+              <a:rPr lang="pt-BR" dirty="0">
+                <a:solidFill>
+                  <a:schemeClr val="bg1"/>
+                </a:solidFill>
+              </a:rPr>
+              <a:t>Não trabalha ligado a TI</a:t>
+            </a:r>
+          </a:p>
+          <a:p>
+            <a:pPr marL="285750" indent="-285750">
+              <a:buFont typeface="Arial" panose="020B0604020202020204" pitchFamily="34" charset="0"/>
+              <a:buChar char="•"/>
+            </a:pPr>
+            <a:r>
+              <a:rPr lang="pt-BR" dirty="0">
+                <a:solidFill>
+                  <a:schemeClr val="bg1"/>
+                </a:solidFill>
+              </a:rPr>
+              <a:t>Alta comunicação</a:t>
+            </a:r>
+          </a:p>
+          <a:p>
+            <a:pPr marL="285750" indent="-285750">
+              <a:buFont typeface="Arial" panose="020B0604020202020204" pitchFamily="34" charset="0"/>
+              <a:buChar char="•"/>
+            </a:pPr>
+            <a:r>
+              <a:rPr lang="pt-BR" dirty="0">
+                <a:solidFill>
+                  <a:schemeClr val="bg1"/>
+                </a:solidFill>
+              </a:rPr>
+              <a:t>Média habilidade tecnológica</a:t>
+            </a:r>
+          </a:p>
+          <a:p>
+            <a:pPr marL="285750" indent="-285750">
+              <a:buFont typeface="Arial" panose="020B0604020202020204" pitchFamily="34" charset="0"/>
+              <a:buChar char="•"/>
+            </a:pPr>
+            <a:r>
+              <a:rPr lang="pt-BR" dirty="0">
+                <a:solidFill>
+                  <a:schemeClr val="bg1"/>
+                </a:solidFill>
+              </a:rPr>
+              <a:t>Trabalho constante</a:t>
+            </a:r>
+          </a:p>
+          <a:p>
+            <a:pPr marL="285750" indent="-285750">
+              <a:buFont typeface="Arial" panose="020B0604020202020204" pitchFamily="34" charset="0"/>
+              <a:buChar char="•"/>
+            </a:pPr>
+            <a:r>
+              <a:rPr lang="pt-BR" dirty="0">
+                <a:solidFill>
+                  <a:schemeClr val="bg1"/>
+                </a:solidFill>
+              </a:rPr>
+              <a:t>Dorme pouco</a:t>
+            </a:r>
+          </a:p>
+          <a:p>
+            <a:pPr marL="285750" indent="-285750">
+              <a:buFont typeface="Arial" panose="020B0604020202020204" pitchFamily="34" charset="0"/>
+              <a:buChar char="•"/>
+            </a:pPr>
+            <a:r>
+              <a:rPr lang="pt-BR" dirty="0">
+                <a:solidFill>
+                  <a:schemeClr val="bg1"/>
+                </a:solidFill>
+              </a:rPr>
+              <a:t>Altos níveis de estresse </a:t>
+            </a:r>
+          </a:p>
+        </p:txBody>
+      </p:sp>
+      <p:sp>
+        <p:nvSpPr>
+          <p:cNvPr id="20" name="Retângulo 19">
+            <a:extLst>
+              <a:ext uri="{FF2B5EF4-FFF2-40B4-BE49-F238E27FC236}">
+                <a16:creationId xmlns:a16="http://schemas.microsoft.com/office/drawing/2014/main" id="{46F04E45-388A-4965-938E-29192B848931}"/>
+              </a:ext>
+            </a:extLst>
+          </p:cNvPr>
+          <p:cNvSpPr/>
+          <p:nvPr/>
+        </p:nvSpPr>
+        <p:spPr>
+          <a:xfrm>
+            <a:off x="468573" y="4196866"/>
+            <a:ext cx="6096000" cy="2308324"/>
+          </a:xfrm>
+          <a:prstGeom prst="rect">
+            <a:avLst/>
+          </a:prstGeom>
+        </p:spPr>
+        <p:txBody>
+          <a:bodyPr>
+            <a:spAutoFit/>
+          </a:bodyPr>
+          <a:lstStyle/>
+          <a:p>
+            <a:pPr marL="285750" indent="-285750">
+              <a:buFont typeface="Arial" panose="020B0604020202020204" pitchFamily="34" charset="0"/>
+              <a:buChar char="•"/>
+            </a:pPr>
+            <a:r>
+              <a:rPr lang="pt-BR" dirty="0">
+                <a:solidFill>
+                  <a:schemeClr val="bg1"/>
+                </a:solidFill>
+              </a:rPr>
+              <a:t>Utilização de registros manuais.</a:t>
+            </a:r>
+          </a:p>
+          <a:p>
+            <a:pPr marL="285750" indent="-285750">
+              <a:buFont typeface="Arial" panose="020B0604020202020204" pitchFamily="34" charset="0"/>
+              <a:buChar char="•"/>
+            </a:pPr>
+            <a:r>
+              <a:rPr lang="pt-BR" dirty="0">
+                <a:solidFill>
+                  <a:schemeClr val="bg1"/>
+                </a:solidFill>
+              </a:rPr>
+              <a:t>Equipe de Suporte.</a:t>
+            </a:r>
+          </a:p>
+          <a:p>
+            <a:pPr marL="285750" indent="-285750">
+              <a:buFont typeface="Arial" panose="020B0604020202020204" pitchFamily="34" charset="0"/>
+              <a:buChar char="•"/>
+            </a:pPr>
+            <a:r>
+              <a:rPr lang="pt-BR" dirty="0">
+                <a:solidFill>
+                  <a:schemeClr val="bg1"/>
+                </a:solidFill>
+              </a:rPr>
+              <a:t>Orçamento limitado para investimentos em tecnologia.</a:t>
+            </a:r>
+          </a:p>
+          <a:p>
+            <a:pPr marL="285750" indent="-285750">
+              <a:buFont typeface="Arial" panose="020B0604020202020204" pitchFamily="34" charset="0"/>
+              <a:buChar char="•"/>
+            </a:pPr>
+            <a:r>
+              <a:rPr lang="pt-BR" dirty="0">
+                <a:solidFill>
+                  <a:schemeClr val="bg1"/>
+                </a:solidFill>
+              </a:rPr>
+              <a:t>Melhor visibilidade e comunicação de negócios (equipes).</a:t>
+            </a:r>
+          </a:p>
+          <a:p>
+            <a:pPr marL="285750" indent="-285750">
+              <a:buFont typeface="Arial" panose="020B0604020202020204" pitchFamily="34" charset="0"/>
+              <a:buChar char="•"/>
+            </a:pPr>
+            <a:r>
+              <a:rPr lang="pt-BR" dirty="0">
+                <a:solidFill>
+                  <a:schemeClr val="bg1"/>
+                </a:solidFill>
+              </a:rPr>
+              <a:t>Problemas com inadimplência</a:t>
+            </a:r>
+          </a:p>
+          <a:p>
+            <a:pPr marL="285750" indent="-285750">
+              <a:buFont typeface="Arial" panose="020B0604020202020204" pitchFamily="34" charset="0"/>
+              <a:buChar char="•"/>
+            </a:pPr>
+            <a:r>
+              <a:rPr lang="pt-BR" dirty="0">
+                <a:solidFill>
+                  <a:schemeClr val="bg1"/>
+                </a:solidFill>
+              </a:rPr>
+              <a:t>Distanciamento social</a:t>
+            </a:r>
+          </a:p>
+          <a:p>
+            <a:pPr marL="285750" indent="-285750">
+              <a:buFont typeface="Arial" panose="020B0604020202020204" pitchFamily="34" charset="0"/>
+              <a:buChar char="•"/>
+            </a:pPr>
+            <a:r>
+              <a:rPr lang="pt-BR" dirty="0">
+                <a:solidFill>
+                  <a:schemeClr val="bg1"/>
+                </a:solidFill>
+              </a:rPr>
+              <a:t>Atraso de mercadorias</a:t>
+            </a:r>
+          </a:p>
+          <a:p>
+            <a:pPr marL="285750" indent="-285750">
+              <a:buFont typeface="Arial" panose="020B0604020202020204" pitchFamily="34" charset="0"/>
+              <a:buChar char="•"/>
+            </a:pPr>
+            <a:r>
+              <a:rPr lang="pt-BR" dirty="0">
+                <a:solidFill>
+                  <a:schemeClr val="bg1"/>
+                </a:solidFill>
+              </a:rPr>
+              <a:t>Mudança no fluxo de produtos</a:t>
+            </a:r>
+          </a:p>
+        </p:txBody>
+      </p:sp>
+    </p:spTree>
+    <p:extLst>
+      <p:ext uri="{BB962C8B-B14F-4D97-AF65-F5344CB8AC3E}">
+        <p14:creationId xmlns:p14="http://schemas.microsoft.com/office/powerpoint/2010/main" val="792514129"/>
+      </p:ext>
+    </p:extLst>
+  </p:cSld>
+  <p:clrMapOvr>
+    <a:masterClrMapping/>
+  </p:clrMapOvr>
+</p:sld>
+</file>
+
+<file path=ppt/slides/slide4.xml><?xml version="1.0" encoding="utf-8"?>
+<p:sld xmlns:a="http://schemas.openxmlformats.org/drawingml/2006/main" xmlns:r="http://schemas.openxmlformats.org/officeDocument/2006/relationships" xmlns:p="http://schemas.openxmlformats.org/presentationml/2006/main">
+  <p:cSld>
+    <p:spTree>
+      <p:nvGrpSpPr>
+        <p:cNvPr id="1" name=""/>
+        <p:cNvGrpSpPr/>
+        <p:nvPr/>
+      </p:nvGrpSpPr>
+      <p:grpSpPr>
+        <a:xfrm>
+          <a:off x="0" y="0"/>
+          <a:ext cx="0" cy="0"/>
+          <a:chOff x="0" y="0"/>
+          <a:chExt cx="0" cy="0"/>
+        </a:xfrm>
+      </p:grpSpPr>
+      <p:sp>
+        <p:nvSpPr>
+          <p:cNvPr id="4" name="Retângulo 3">
+            <a:extLst>
+              <a:ext uri="{FF2B5EF4-FFF2-40B4-BE49-F238E27FC236}">
+                <a16:creationId xmlns:a16="http://schemas.microsoft.com/office/drawing/2014/main" id="{A10BB73B-13C5-4F92-845A-BFB7C32C3C64}"/>
+              </a:ext>
+            </a:extLst>
+          </p:cNvPr>
+          <p:cNvSpPr/>
+          <p:nvPr/>
+        </p:nvSpPr>
+        <p:spPr>
+          <a:xfrm>
+            <a:off x="0" y="0"/>
+            <a:ext cx="9303025" cy="6858000"/>
+          </a:xfrm>
+          <a:prstGeom prst="rect">
+            <a:avLst/>
+          </a:prstGeom>
+          <a:solidFill>
+            <a:schemeClr val="tx2">
+              <a:lumMod val="75000"/>
+            </a:schemeClr>
+          </a:solidFill>
+        </p:spPr>
+        <p:style>
+          <a:lnRef idx="2">
+            <a:schemeClr val="accent1">
+              <a:shade val="50000"/>
+            </a:schemeClr>
+          </a:lnRef>
+          <a:fillRef idx="1">
+            <a:schemeClr val="accent1"/>
+          </a:fillRef>
+          <a:effectRef idx="0">
+            <a:schemeClr val="accent1"/>
+          </a:effectRef>
+          <a:fontRef idx="minor">
+            <a:schemeClr val="lt1"/>
+          </a:fontRef>
+        </p:style>
+        <p:txBody>
+          <a:bodyPr rtlCol="0" anchor="ctr"/>
+          <a:lstStyle/>
+          <a:p>
+            <a:endParaRPr lang="pt-BR" b="1" dirty="0">
+              <a:solidFill>
+                <a:schemeClr val="bg1"/>
+              </a:solidFill>
+              <a:latin typeface="Arial" panose="020B0604020202020204" pitchFamily="34" charset="0"/>
+              <a:cs typeface="Arial" panose="020B0604020202020204" pitchFamily="34" charset="0"/>
+            </a:endParaRPr>
+          </a:p>
+        </p:txBody>
+      </p:sp>
+      <p:sp>
+        <p:nvSpPr>
+          <p:cNvPr id="8" name="Retângulo 7">
+            <a:extLst>
+              <a:ext uri="{FF2B5EF4-FFF2-40B4-BE49-F238E27FC236}">
+                <a16:creationId xmlns:a16="http://schemas.microsoft.com/office/drawing/2014/main" id="{2FCAD7BC-2284-425E-8754-BC24B1747BD9}"/>
+              </a:ext>
+            </a:extLst>
+          </p:cNvPr>
+          <p:cNvSpPr/>
+          <p:nvPr/>
+        </p:nvSpPr>
+        <p:spPr>
+          <a:xfrm>
+            <a:off x="9303025" y="0"/>
+            <a:ext cx="2888975" cy="6858000"/>
+          </a:xfrm>
+          <a:prstGeom prst="rect">
+            <a:avLst/>
+          </a:prstGeom>
+          <a:solidFill>
+            <a:srgbClr val="0070C0"/>
+          </a:solidFill>
+        </p:spPr>
+        <p:style>
+          <a:lnRef idx="2">
+            <a:schemeClr val="accent1">
+              <a:shade val="50000"/>
+            </a:schemeClr>
+          </a:lnRef>
+          <a:fillRef idx="1">
+            <a:schemeClr val="accent1"/>
+          </a:fillRef>
+          <a:effectRef idx="0">
+            <a:schemeClr val="accent1"/>
+          </a:effectRef>
+          <a:fontRef idx="minor">
+            <a:schemeClr val="lt1"/>
+          </a:fontRef>
+        </p:style>
+        <p:txBody>
+          <a:bodyPr rtlCol="0" anchor="ctr"/>
+          <a:lstStyle/>
+          <a:p>
+            <a:endParaRPr lang="pt-BR" b="1" dirty="0">
+              <a:solidFill>
+                <a:schemeClr val="bg1"/>
+              </a:solidFill>
+              <a:latin typeface="Arial" panose="020B0604020202020204" pitchFamily="34" charset="0"/>
+              <a:cs typeface="Arial" panose="020B0604020202020204" pitchFamily="34" charset="0"/>
+            </a:endParaRPr>
+          </a:p>
+        </p:txBody>
+      </p:sp>
+      <p:sp>
+        <p:nvSpPr>
+          <p:cNvPr id="2" name="Título 1">
+            <a:extLst>
+              <a:ext uri="{FF2B5EF4-FFF2-40B4-BE49-F238E27FC236}">
+                <a16:creationId xmlns:a16="http://schemas.microsoft.com/office/drawing/2014/main" id="{7A11EE29-D9B2-4A05-A636-FABA653A1F40}"/>
+              </a:ext>
+            </a:extLst>
+          </p:cNvPr>
+          <p:cNvSpPr>
+            <a:spLocks noGrp="1"/>
+          </p:cNvSpPr>
+          <p:nvPr>
+            <p:ph type="ctrTitle"/>
+          </p:nvPr>
+        </p:nvSpPr>
+        <p:spPr/>
+        <p:txBody>
+          <a:bodyPr/>
+          <a:lstStyle/>
+          <a:p>
+            <a:endParaRPr lang="pt-BR"/>
+          </a:p>
+        </p:txBody>
+      </p:sp>
+      <p:sp>
+        <p:nvSpPr>
+          <p:cNvPr id="3" name="Subtítulo 2">
+            <a:extLst>
+              <a:ext uri="{FF2B5EF4-FFF2-40B4-BE49-F238E27FC236}">
+                <a16:creationId xmlns:a16="http://schemas.microsoft.com/office/drawing/2014/main" id="{7D1C3AF2-7435-4FE8-A0E7-DC05DB9E6C1A}"/>
+              </a:ext>
+            </a:extLst>
+          </p:cNvPr>
+          <p:cNvSpPr>
+            <a:spLocks noGrp="1"/>
+          </p:cNvSpPr>
+          <p:nvPr>
+            <p:ph type="subTitle" idx="1"/>
+          </p:nvPr>
+        </p:nvSpPr>
+        <p:spPr/>
+        <p:txBody>
+          <a:bodyPr/>
+          <a:lstStyle/>
+          <a:p>
+            <a:endParaRPr lang="pt-BR" dirty="0"/>
+          </a:p>
+        </p:txBody>
+      </p:sp>
+      <p:sp>
+        <p:nvSpPr>
+          <p:cNvPr id="5" name="CaixaDeTexto 4">
+            <a:extLst>
+              <a:ext uri="{FF2B5EF4-FFF2-40B4-BE49-F238E27FC236}">
+                <a16:creationId xmlns:a16="http://schemas.microsoft.com/office/drawing/2014/main" id="{9D0108FE-3AE4-4C97-BAEA-C9907C60FA98}"/>
+              </a:ext>
+            </a:extLst>
+          </p:cNvPr>
+          <p:cNvSpPr txBox="1"/>
+          <p:nvPr/>
+        </p:nvSpPr>
+        <p:spPr>
+          <a:xfrm>
+            <a:off x="2503447" y="1926610"/>
+            <a:ext cx="5857461" cy="923330"/>
+          </a:xfrm>
+          <a:prstGeom prst="rect">
+            <a:avLst/>
+          </a:prstGeom>
+          <a:noFill/>
+        </p:spPr>
+        <p:txBody>
+          <a:bodyPr wrap="square" rtlCol="0">
+            <a:spAutoFit/>
+          </a:bodyPr>
+          <a:lstStyle/>
+          <a:p>
+            <a:r>
+              <a:rPr lang="pt-BR" sz="5400" b="1" dirty="0">
+                <a:solidFill>
+                  <a:schemeClr val="bg1"/>
+                </a:solidFill>
+                <a:latin typeface="Arial" panose="020B0604020202020204" pitchFamily="34" charset="0"/>
+                <a:cs typeface="Arial" panose="020B0604020202020204" pitchFamily="34" charset="0"/>
+              </a:rPr>
+              <a:t>USER STORY</a:t>
+            </a:r>
+          </a:p>
+        </p:txBody>
+      </p:sp>
+      <p:sp>
+        <p:nvSpPr>
+          <p:cNvPr id="15" name="Retângulo 14">
+            <a:extLst>
+              <a:ext uri="{FF2B5EF4-FFF2-40B4-BE49-F238E27FC236}">
+                <a16:creationId xmlns:a16="http://schemas.microsoft.com/office/drawing/2014/main" id="{1F878B66-142E-490A-8E45-3D187F0CAE54}"/>
+              </a:ext>
+            </a:extLst>
+          </p:cNvPr>
+          <p:cNvSpPr/>
+          <p:nvPr/>
+        </p:nvSpPr>
+        <p:spPr>
+          <a:xfrm>
+            <a:off x="295886" y="264101"/>
+            <a:ext cx="741347" cy="83226"/>
+          </a:xfrm>
+          <a:prstGeom prst="rect">
+            <a:avLst/>
+          </a:prstGeom>
+          <a:solidFill>
+            <a:srgbClr val="00B0F0"/>
+          </a:solidFill>
+          <a:ln w="38100">
+            <a:solidFill>
+              <a:srgbClr val="00B0F0"/>
+            </a:solidFill>
+          </a:ln>
+          <a:effectLst/>
+        </p:spPr>
+        <p:style>
+          <a:lnRef idx="2">
+            <a:schemeClr val="accent1">
+              <a:shade val="50000"/>
+            </a:schemeClr>
+          </a:lnRef>
+          <a:fillRef idx="1">
+            <a:schemeClr val="accent1"/>
+          </a:fillRef>
+          <a:effectRef idx="0">
+            <a:schemeClr val="accent1"/>
+          </a:effectRef>
+          <a:fontRef idx="minor">
+            <a:schemeClr val="lt1"/>
+          </a:fontRef>
+        </p:style>
+        <p:txBody>
+          <a:bodyPr rtlCol="0" anchor="ctr"/>
+          <a:lstStyle/>
+          <a:p>
+            <a:pPr algn="ctr"/>
+            <a:endParaRPr lang="pt-BR"/>
+          </a:p>
+        </p:txBody>
+      </p:sp>
+      <p:sp>
+        <p:nvSpPr>
+          <p:cNvPr id="13" name="CaixaDeTexto 12">
+            <a:extLst>
+              <a:ext uri="{FF2B5EF4-FFF2-40B4-BE49-F238E27FC236}">
+                <a16:creationId xmlns:a16="http://schemas.microsoft.com/office/drawing/2014/main" id="{D663E68C-D2F4-4DEE-8511-FDB820843F74}"/>
+              </a:ext>
+            </a:extLst>
+          </p:cNvPr>
+          <p:cNvSpPr txBox="1"/>
+          <p:nvPr/>
+        </p:nvSpPr>
+        <p:spPr>
+          <a:xfrm>
+            <a:off x="1454675" y="3762671"/>
+            <a:ext cx="5592417" cy="2308324"/>
+          </a:xfrm>
+          <a:prstGeom prst="rect">
+            <a:avLst/>
+          </a:prstGeom>
+          <a:noFill/>
+        </p:spPr>
+        <p:txBody>
+          <a:bodyPr wrap="square" rtlCol="0">
+            <a:spAutoFit/>
+          </a:bodyPr>
+          <a:lstStyle/>
+          <a:p>
+            <a:pPr algn="r"/>
+            <a:r>
+              <a:rPr lang="pt-BR" dirty="0" err="1">
+                <a:solidFill>
+                  <a:schemeClr val="bg1"/>
+                </a:solidFill>
+                <a:latin typeface="Arial" panose="020B0604020202020204" pitchFamily="34" charset="0"/>
+                <a:cs typeface="Arial" panose="020B0604020202020204" pitchFamily="34" charset="0"/>
+              </a:rPr>
+              <a:t>Lorem</a:t>
+            </a:r>
+            <a:r>
+              <a:rPr lang="pt-BR" dirty="0">
+                <a:solidFill>
+                  <a:schemeClr val="bg1"/>
+                </a:solidFill>
+                <a:latin typeface="Arial" panose="020B0604020202020204" pitchFamily="34" charset="0"/>
+                <a:cs typeface="Arial" panose="020B0604020202020204" pitchFamily="34" charset="0"/>
+              </a:rPr>
+              <a:t> ipsum </a:t>
+            </a:r>
+            <a:r>
+              <a:rPr lang="pt-BR" dirty="0" err="1">
+                <a:solidFill>
+                  <a:schemeClr val="bg1"/>
+                </a:solidFill>
+                <a:latin typeface="Arial" panose="020B0604020202020204" pitchFamily="34" charset="0"/>
+                <a:cs typeface="Arial" panose="020B0604020202020204" pitchFamily="34" charset="0"/>
+              </a:rPr>
+              <a:t>dolor</a:t>
+            </a:r>
+            <a:r>
+              <a:rPr lang="pt-BR" dirty="0">
+                <a:solidFill>
+                  <a:schemeClr val="bg1"/>
+                </a:solidFill>
+                <a:latin typeface="Arial" panose="020B0604020202020204" pitchFamily="34" charset="0"/>
+                <a:cs typeface="Arial" panose="020B0604020202020204" pitchFamily="34" charset="0"/>
+              </a:rPr>
+              <a:t> </a:t>
+            </a:r>
+            <a:r>
+              <a:rPr lang="pt-BR" dirty="0" err="1">
+                <a:solidFill>
+                  <a:schemeClr val="bg1"/>
+                </a:solidFill>
+                <a:latin typeface="Arial" panose="020B0604020202020204" pitchFamily="34" charset="0"/>
+                <a:cs typeface="Arial" panose="020B0604020202020204" pitchFamily="34" charset="0"/>
+              </a:rPr>
+              <a:t>sit</a:t>
+            </a:r>
+            <a:r>
+              <a:rPr lang="pt-BR" dirty="0">
+                <a:solidFill>
+                  <a:schemeClr val="bg1"/>
+                </a:solidFill>
+                <a:latin typeface="Arial" panose="020B0604020202020204" pitchFamily="34" charset="0"/>
+                <a:cs typeface="Arial" panose="020B0604020202020204" pitchFamily="34" charset="0"/>
+              </a:rPr>
+              <a:t> </a:t>
+            </a:r>
+            <a:r>
+              <a:rPr lang="pt-BR" dirty="0" err="1">
+                <a:solidFill>
+                  <a:schemeClr val="bg1"/>
+                </a:solidFill>
+                <a:latin typeface="Arial" panose="020B0604020202020204" pitchFamily="34" charset="0"/>
+                <a:cs typeface="Arial" panose="020B0604020202020204" pitchFamily="34" charset="0"/>
+              </a:rPr>
+              <a:t>amet</a:t>
+            </a:r>
+            <a:r>
+              <a:rPr lang="pt-BR" dirty="0">
+                <a:solidFill>
+                  <a:schemeClr val="bg1"/>
+                </a:solidFill>
+                <a:latin typeface="Arial" panose="020B0604020202020204" pitchFamily="34" charset="0"/>
+                <a:cs typeface="Arial" panose="020B0604020202020204" pitchFamily="34" charset="0"/>
+              </a:rPr>
+              <a:t>, </a:t>
+            </a:r>
+            <a:r>
+              <a:rPr lang="pt-BR" dirty="0" err="1">
+                <a:solidFill>
+                  <a:schemeClr val="bg1"/>
+                </a:solidFill>
+                <a:latin typeface="Arial" panose="020B0604020202020204" pitchFamily="34" charset="0"/>
+                <a:cs typeface="Arial" panose="020B0604020202020204" pitchFamily="34" charset="0"/>
+              </a:rPr>
+              <a:t>consectetur</a:t>
+            </a:r>
+            <a:r>
+              <a:rPr lang="pt-BR" dirty="0">
+                <a:solidFill>
+                  <a:schemeClr val="bg1"/>
+                </a:solidFill>
+                <a:latin typeface="Arial" panose="020B0604020202020204" pitchFamily="34" charset="0"/>
+                <a:cs typeface="Arial" panose="020B0604020202020204" pitchFamily="34" charset="0"/>
+              </a:rPr>
+              <a:t> </a:t>
+            </a:r>
+            <a:r>
+              <a:rPr lang="pt-BR" dirty="0" err="1">
+                <a:solidFill>
+                  <a:schemeClr val="bg1"/>
+                </a:solidFill>
+                <a:latin typeface="Arial" panose="020B0604020202020204" pitchFamily="34" charset="0"/>
+                <a:cs typeface="Arial" panose="020B0604020202020204" pitchFamily="34" charset="0"/>
+              </a:rPr>
+              <a:t>adipiscing</a:t>
+            </a:r>
+            <a:r>
+              <a:rPr lang="pt-BR" dirty="0">
+                <a:solidFill>
+                  <a:schemeClr val="bg1"/>
+                </a:solidFill>
+                <a:latin typeface="Arial" panose="020B0604020202020204" pitchFamily="34" charset="0"/>
+                <a:cs typeface="Arial" panose="020B0604020202020204" pitchFamily="34" charset="0"/>
+              </a:rPr>
+              <a:t> </a:t>
+            </a:r>
+            <a:r>
+              <a:rPr lang="pt-BR" dirty="0" err="1">
+                <a:solidFill>
+                  <a:schemeClr val="bg1"/>
+                </a:solidFill>
+                <a:latin typeface="Arial" panose="020B0604020202020204" pitchFamily="34" charset="0"/>
+                <a:cs typeface="Arial" panose="020B0604020202020204" pitchFamily="34" charset="0"/>
+              </a:rPr>
+              <a:t>elit</a:t>
+            </a:r>
+            <a:r>
+              <a:rPr lang="pt-BR" dirty="0">
+                <a:solidFill>
+                  <a:schemeClr val="bg1"/>
+                </a:solidFill>
+                <a:latin typeface="Arial" panose="020B0604020202020204" pitchFamily="34" charset="0"/>
+                <a:cs typeface="Arial" panose="020B0604020202020204" pitchFamily="34" charset="0"/>
+              </a:rPr>
+              <a:t>. </a:t>
+            </a:r>
+            <a:r>
+              <a:rPr lang="pt-BR" dirty="0" err="1">
+                <a:solidFill>
+                  <a:schemeClr val="bg1"/>
+                </a:solidFill>
+                <a:latin typeface="Arial" panose="020B0604020202020204" pitchFamily="34" charset="0"/>
+                <a:cs typeface="Arial" panose="020B0604020202020204" pitchFamily="34" charset="0"/>
+              </a:rPr>
+              <a:t>Sed</a:t>
+            </a:r>
+            <a:r>
+              <a:rPr lang="pt-BR" dirty="0">
+                <a:solidFill>
+                  <a:schemeClr val="bg1"/>
+                </a:solidFill>
+                <a:latin typeface="Arial" panose="020B0604020202020204" pitchFamily="34" charset="0"/>
+                <a:cs typeface="Arial" panose="020B0604020202020204" pitchFamily="34" charset="0"/>
+              </a:rPr>
+              <a:t> in </a:t>
+            </a:r>
+            <a:r>
+              <a:rPr lang="pt-BR" dirty="0" err="1">
+                <a:solidFill>
+                  <a:schemeClr val="bg1"/>
+                </a:solidFill>
+                <a:latin typeface="Arial" panose="020B0604020202020204" pitchFamily="34" charset="0"/>
+                <a:cs typeface="Arial" panose="020B0604020202020204" pitchFamily="34" charset="0"/>
+              </a:rPr>
+              <a:t>maximus</a:t>
+            </a:r>
+            <a:r>
+              <a:rPr lang="pt-BR" dirty="0">
+                <a:solidFill>
+                  <a:schemeClr val="bg1"/>
+                </a:solidFill>
+                <a:latin typeface="Arial" panose="020B0604020202020204" pitchFamily="34" charset="0"/>
+                <a:cs typeface="Arial" panose="020B0604020202020204" pitchFamily="34" charset="0"/>
+              </a:rPr>
+              <a:t> </a:t>
+            </a:r>
+            <a:r>
+              <a:rPr lang="pt-BR" dirty="0" err="1">
+                <a:solidFill>
+                  <a:schemeClr val="bg1"/>
+                </a:solidFill>
+                <a:latin typeface="Arial" panose="020B0604020202020204" pitchFamily="34" charset="0"/>
+                <a:cs typeface="Arial" panose="020B0604020202020204" pitchFamily="34" charset="0"/>
+              </a:rPr>
+              <a:t>dui</a:t>
+            </a:r>
+            <a:r>
+              <a:rPr lang="pt-BR" dirty="0">
+                <a:solidFill>
+                  <a:schemeClr val="bg1"/>
+                </a:solidFill>
+                <a:latin typeface="Arial" panose="020B0604020202020204" pitchFamily="34" charset="0"/>
+                <a:cs typeface="Arial" panose="020B0604020202020204" pitchFamily="34" charset="0"/>
+              </a:rPr>
+              <a:t>. </a:t>
+            </a:r>
+            <a:r>
+              <a:rPr lang="pt-BR" dirty="0" err="1">
+                <a:solidFill>
+                  <a:schemeClr val="bg1"/>
+                </a:solidFill>
+                <a:latin typeface="Arial" panose="020B0604020202020204" pitchFamily="34" charset="0"/>
+                <a:cs typeface="Arial" panose="020B0604020202020204" pitchFamily="34" charset="0"/>
+              </a:rPr>
+              <a:t>Curabitur</a:t>
+            </a:r>
+            <a:r>
+              <a:rPr lang="pt-BR" dirty="0">
+                <a:solidFill>
+                  <a:schemeClr val="bg1"/>
+                </a:solidFill>
+                <a:latin typeface="Arial" panose="020B0604020202020204" pitchFamily="34" charset="0"/>
+                <a:cs typeface="Arial" panose="020B0604020202020204" pitchFamily="34" charset="0"/>
+              </a:rPr>
+              <a:t> </a:t>
+            </a:r>
+            <a:r>
+              <a:rPr lang="pt-BR" dirty="0" err="1">
+                <a:solidFill>
+                  <a:schemeClr val="bg1"/>
+                </a:solidFill>
+                <a:latin typeface="Arial" panose="020B0604020202020204" pitchFamily="34" charset="0"/>
+                <a:cs typeface="Arial" panose="020B0604020202020204" pitchFamily="34" charset="0"/>
+              </a:rPr>
+              <a:t>blandit</a:t>
+            </a:r>
+            <a:r>
+              <a:rPr lang="pt-BR" dirty="0">
+                <a:solidFill>
+                  <a:schemeClr val="bg1"/>
+                </a:solidFill>
+                <a:latin typeface="Arial" panose="020B0604020202020204" pitchFamily="34" charset="0"/>
+                <a:cs typeface="Arial" panose="020B0604020202020204" pitchFamily="34" charset="0"/>
+              </a:rPr>
+              <a:t>, </a:t>
+            </a:r>
+            <a:r>
+              <a:rPr lang="pt-BR" dirty="0" err="1">
+                <a:solidFill>
+                  <a:schemeClr val="bg1"/>
+                </a:solidFill>
+                <a:latin typeface="Arial" panose="020B0604020202020204" pitchFamily="34" charset="0"/>
+                <a:cs typeface="Arial" panose="020B0604020202020204" pitchFamily="34" charset="0"/>
+              </a:rPr>
+              <a:t>dolor</a:t>
+            </a:r>
+            <a:r>
+              <a:rPr lang="pt-BR" dirty="0">
+                <a:solidFill>
+                  <a:schemeClr val="bg1"/>
+                </a:solidFill>
+                <a:latin typeface="Arial" panose="020B0604020202020204" pitchFamily="34" charset="0"/>
+                <a:cs typeface="Arial" panose="020B0604020202020204" pitchFamily="34" charset="0"/>
+              </a:rPr>
+              <a:t> a </a:t>
+            </a:r>
+            <a:r>
+              <a:rPr lang="pt-BR" dirty="0" err="1">
+                <a:solidFill>
+                  <a:schemeClr val="bg1"/>
+                </a:solidFill>
+                <a:latin typeface="Arial" panose="020B0604020202020204" pitchFamily="34" charset="0"/>
+                <a:cs typeface="Arial" panose="020B0604020202020204" pitchFamily="34" charset="0"/>
+              </a:rPr>
+              <a:t>hendrerit</a:t>
+            </a:r>
+            <a:r>
+              <a:rPr lang="pt-BR" dirty="0">
+                <a:solidFill>
+                  <a:schemeClr val="bg1"/>
+                </a:solidFill>
+                <a:latin typeface="Arial" panose="020B0604020202020204" pitchFamily="34" charset="0"/>
+                <a:cs typeface="Arial" panose="020B0604020202020204" pitchFamily="34" charset="0"/>
+              </a:rPr>
+              <a:t> </a:t>
+            </a:r>
+            <a:r>
+              <a:rPr lang="pt-BR" dirty="0" err="1">
+                <a:solidFill>
+                  <a:schemeClr val="bg1"/>
+                </a:solidFill>
+                <a:latin typeface="Arial" panose="020B0604020202020204" pitchFamily="34" charset="0"/>
+                <a:cs typeface="Arial" panose="020B0604020202020204" pitchFamily="34" charset="0"/>
+              </a:rPr>
+              <a:t>luctus</a:t>
+            </a:r>
+            <a:r>
+              <a:rPr lang="pt-BR" dirty="0">
+                <a:solidFill>
+                  <a:schemeClr val="bg1"/>
+                </a:solidFill>
+                <a:latin typeface="Arial" panose="020B0604020202020204" pitchFamily="34" charset="0"/>
+                <a:cs typeface="Arial" panose="020B0604020202020204" pitchFamily="34" charset="0"/>
+              </a:rPr>
+              <a:t>, </a:t>
+            </a:r>
+            <a:r>
+              <a:rPr lang="pt-BR" dirty="0" err="1">
+                <a:solidFill>
+                  <a:schemeClr val="bg1"/>
+                </a:solidFill>
+                <a:latin typeface="Arial" panose="020B0604020202020204" pitchFamily="34" charset="0"/>
+                <a:cs typeface="Arial" panose="020B0604020202020204" pitchFamily="34" charset="0"/>
+              </a:rPr>
+              <a:t>lectus</a:t>
+            </a:r>
+            <a:r>
+              <a:rPr lang="pt-BR" dirty="0">
+                <a:solidFill>
+                  <a:schemeClr val="bg1"/>
+                </a:solidFill>
+                <a:latin typeface="Arial" panose="020B0604020202020204" pitchFamily="34" charset="0"/>
+                <a:cs typeface="Arial" panose="020B0604020202020204" pitchFamily="34" charset="0"/>
+              </a:rPr>
+              <a:t> ante </a:t>
+            </a:r>
+            <a:r>
+              <a:rPr lang="pt-BR" dirty="0" err="1">
+                <a:solidFill>
+                  <a:schemeClr val="bg1"/>
+                </a:solidFill>
+                <a:latin typeface="Arial" panose="020B0604020202020204" pitchFamily="34" charset="0"/>
+                <a:cs typeface="Arial" panose="020B0604020202020204" pitchFamily="34" charset="0"/>
+              </a:rPr>
+              <a:t>venenatis</a:t>
+            </a:r>
+            <a:r>
+              <a:rPr lang="pt-BR" dirty="0">
+                <a:solidFill>
+                  <a:schemeClr val="bg1"/>
+                </a:solidFill>
+                <a:latin typeface="Arial" panose="020B0604020202020204" pitchFamily="34" charset="0"/>
+                <a:cs typeface="Arial" panose="020B0604020202020204" pitchFamily="34" charset="0"/>
+              </a:rPr>
+              <a:t> </a:t>
+            </a:r>
+            <a:r>
+              <a:rPr lang="pt-BR" dirty="0" err="1">
+                <a:solidFill>
+                  <a:schemeClr val="bg1"/>
+                </a:solidFill>
+                <a:latin typeface="Arial" panose="020B0604020202020204" pitchFamily="34" charset="0"/>
+                <a:cs typeface="Arial" panose="020B0604020202020204" pitchFamily="34" charset="0"/>
+              </a:rPr>
+              <a:t>ex</a:t>
+            </a:r>
+            <a:r>
+              <a:rPr lang="pt-BR" dirty="0">
+                <a:solidFill>
+                  <a:schemeClr val="bg1"/>
+                </a:solidFill>
+                <a:latin typeface="Arial" panose="020B0604020202020204" pitchFamily="34" charset="0"/>
+                <a:cs typeface="Arial" panose="020B0604020202020204" pitchFamily="34" charset="0"/>
+              </a:rPr>
+              <a:t>, in </a:t>
+            </a:r>
+            <a:r>
+              <a:rPr lang="pt-BR" dirty="0" err="1">
+                <a:solidFill>
+                  <a:schemeClr val="bg1"/>
+                </a:solidFill>
+                <a:latin typeface="Arial" panose="020B0604020202020204" pitchFamily="34" charset="0"/>
+                <a:cs typeface="Arial" panose="020B0604020202020204" pitchFamily="34" charset="0"/>
+              </a:rPr>
+              <a:t>porttitor</a:t>
+            </a:r>
+            <a:r>
+              <a:rPr lang="pt-BR" dirty="0">
+                <a:solidFill>
+                  <a:schemeClr val="bg1"/>
+                </a:solidFill>
+                <a:latin typeface="Arial" panose="020B0604020202020204" pitchFamily="34" charset="0"/>
+                <a:cs typeface="Arial" panose="020B0604020202020204" pitchFamily="34" charset="0"/>
+              </a:rPr>
+              <a:t> </a:t>
+            </a:r>
+            <a:r>
+              <a:rPr lang="pt-BR" dirty="0" err="1">
+                <a:solidFill>
+                  <a:schemeClr val="bg1"/>
+                </a:solidFill>
+                <a:latin typeface="Arial" panose="020B0604020202020204" pitchFamily="34" charset="0"/>
+                <a:cs typeface="Arial" panose="020B0604020202020204" pitchFamily="34" charset="0"/>
+              </a:rPr>
+              <a:t>neque</a:t>
+            </a:r>
+            <a:r>
+              <a:rPr lang="pt-BR" dirty="0">
+                <a:solidFill>
+                  <a:schemeClr val="bg1"/>
+                </a:solidFill>
+                <a:latin typeface="Arial" panose="020B0604020202020204" pitchFamily="34" charset="0"/>
+                <a:cs typeface="Arial" panose="020B0604020202020204" pitchFamily="34" charset="0"/>
+              </a:rPr>
+              <a:t> </a:t>
+            </a:r>
+            <a:r>
+              <a:rPr lang="pt-BR" dirty="0" err="1">
+                <a:solidFill>
+                  <a:schemeClr val="bg1"/>
+                </a:solidFill>
+                <a:latin typeface="Arial" panose="020B0604020202020204" pitchFamily="34" charset="0"/>
+                <a:cs typeface="Arial" panose="020B0604020202020204" pitchFamily="34" charset="0"/>
+              </a:rPr>
+              <a:t>ligula</a:t>
+            </a:r>
+            <a:r>
+              <a:rPr lang="pt-BR" dirty="0">
+                <a:solidFill>
+                  <a:schemeClr val="bg1"/>
+                </a:solidFill>
+                <a:latin typeface="Arial" panose="020B0604020202020204" pitchFamily="34" charset="0"/>
+                <a:cs typeface="Arial" panose="020B0604020202020204" pitchFamily="34" charset="0"/>
+              </a:rPr>
+              <a:t> </a:t>
+            </a:r>
+            <a:r>
+              <a:rPr lang="pt-BR" dirty="0" err="1">
+                <a:solidFill>
+                  <a:schemeClr val="bg1"/>
+                </a:solidFill>
+                <a:latin typeface="Arial" panose="020B0604020202020204" pitchFamily="34" charset="0"/>
+                <a:cs typeface="Arial" panose="020B0604020202020204" pitchFamily="34" charset="0"/>
+              </a:rPr>
+              <a:t>sit</a:t>
+            </a:r>
+            <a:r>
+              <a:rPr lang="pt-BR" dirty="0">
+                <a:solidFill>
+                  <a:schemeClr val="bg1"/>
+                </a:solidFill>
+                <a:latin typeface="Arial" panose="020B0604020202020204" pitchFamily="34" charset="0"/>
+                <a:cs typeface="Arial" panose="020B0604020202020204" pitchFamily="34" charset="0"/>
+              </a:rPr>
+              <a:t> </a:t>
+            </a:r>
+            <a:r>
+              <a:rPr lang="pt-BR" dirty="0" err="1">
+                <a:solidFill>
+                  <a:schemeClr val="bg1"/>
+                </a:solidFill>
+                <a:latin typeface="Arial" panose="020B0604020202020204" pitchFamily="34" charset="0"/>
+                <a:cs typeface="Arial" panose="020B0604020202020204" pitchFamily="34" charset="0"/>
+              </a:rPr>
+              <a:t>amet</a:t>
+            </a:r>
+            <a:r>
+              <a:rPr lang="pt-BR" dirty="0">
+                <a:solidFill>
+                  <a:schemeClr val="bg1"/>
+                </a:solidFill>
+                <a:latin typeface="Arial" panose="020B0604020202020204" pitchFamily="34" charset="0"/>
+                <a:cs typeface="Arial" panose="020B0604020202020204" pitchFamily="34" charset="0"/>
+              </a:rPr>
+              <a:t> </a:t>
+            </a:r>
+            <a:r>
+              <a:rPr lang="pt-BR" dirty="0" err="1">
+                <a:solidFill>
+                  <a:schemeClr val="bg1"/>
+                </a:solidFill>
+                <a:latin typeface="Arial" panose="020B0604020202020204" pitchFamily="34" charset="0"/>
+                <a:cs typeface="Arial" panose="020B0604020202020204" pitchFamily="34" charset="0"/>
+              </a:rPr>
+              <a:t>neque</a:t>
+            </a:r>
+            <a:r>
+              <a:rPr lang="pt-BR" dirty="0">
+                <a:solidFill>
+                  <a:schemeClr val="bg1"/>
+                </a:solidFill>
+                <a:latin typeface="Arial" panose="020B0604020202020204" pitchFamily="34" charset="0"/>
+                <a:cs typeface="Arial" panose="020B0604020202020204" pitchFamily="34" charset="0"/>
+              </a:rPr>
+              <a:t>. </a:t>
+            </a:r>
+            <a:r>
+              <a:rPr lang="pt-BR" dirty="0" err="1">
+                <a:solidFill>
+                  <a:schemeClr val="bg1"/>
+                </a:solidFill>
+                <a:latin typeface="Arial" panose="020B0604020202020204" pitchFamily="34" charset="0"/>
+                <a:cs typeface="Arial" panose="020B0604020202020204" pitchFamily="34" charset="0"/>
+              </a:rPr>
+              <a:t>Proin</a:t>
+            </a:r>
+            <a:r>
+              <a:rPr lang="pt-BR" dirty="0">
+                <a:solidFill>
+                  <a:schemeClr val="bg1"/>
+                </a:solidFill>
+                <a:latin typeface="Arial" panose="020B0604020202020204" pitchFamily="34" charset="0"/>
+                <a:cs typeface="Arial" panose="020B0604020202020204" pitchFamily="34" charset="0"/>
+              </a:rPr>
+              <a:t> </a:t>
+            </a:r>
+            <a:r>
+              <a:rPr lang="pt-BR" dirty="0" err="1">
+                <a:solidFill>
+                  <a:schemeClr val="bg1"/>
+                </a:solidFill>
+                <a:latin typeface="Arial" panose="020B0604020202020204" pitchFamily="34" charset="0"/>
+                <a:cs typeface="Arial" panose="020B0604020202020204" pitchFamily="34" charset="0"/>
+              </a:rPr>
+              <a:t>ultrices</a:t>
+            </a:r>
+            <a:r>
+              <a:rPr lang="pt-BR" dirty="0">
+                <a:solidFill>
+                  <a:schemeClr val="bg1"/>
+                </a:solidFill>
+                <a:latin typeface="Arial" panose="020B0604020202020204" pitchFamily="34" charset="0"/>
+                <a:cs typeface="Arial" panose="020B0604020202020204" pitchFamily="34" charset="0"/>
+              </a:rPr>
+              <a:t> </a:t>
+            </a:r>
+            <a:r>
+              <a:rPr lang="pt-BR" dirty="0" err="1">
+                <a:solidFill>
+                  <a:schemeClr val="bg1"/>
+                </a:solidFill>
+                <a:latin typeface="Arial" panose="020B0604020202020204" pitchFamily="34" charset="0"/>
+                <a:cs typeface="Arial" panose="020B0604020202020204" pitchFamily="34" charset="0"/>
+              </a:rPr>
+              <a:t>lectus</a:t>
+            </a:r>
+            <a:r>
+              <a:rPr lang="pt-BR" dirty="0">
+                <a:solidFill>
+                  <a:schemeClr val="bg1"/>
+                </a:solidFill>
+                <a:latin typeface="Arial" panose="020B0604020202020204" pitchFamily="34" charset="0"/>
+                <a:cs typeface="Arial" panose="020B0604020202020204" pitchFamily="34" charset="0"/>
+              </a:rPr>
+              <a:t> et </a:t>
+            </a:r>
+            <a:r>
+              <a:rPr lang="pt-BR" dirty="0" err="1">
+                <a:solidFill>
+                  <a:schemeClr val="bg1"/>
+                </a:solidFill>
+                <a:latin typeface="Arial" panose="020B0604020202020204" pitchFamily="34" charset="0"/>
+                <a:cs typeface="Arial" panose="020B0604020202020204" pitchFamily="34" charset="0"/>
+              </a:rPr>
+              <a:t>posuere</a:t>
+            </a:r>
+            <a:r>
+              <a:rPr lang="pt-BR" dirty="0">
+                <a:solidFill>
+                  <a:schemeClr val="bg1"/>
+                </a:solidFill>
+                <a:latin typeface="Arial" panose="020B0604020202020204" pitchFamily="34" charset="0"/>
+                <a:cs typeface="Arial" panose="020B0604020202020204" pitchFamily="34" charset="0"/>
+              </a:rPr>
+              <a:t> </a:t>
+            </a:r>
+            <a:r>
+              <a:rPr lang="pt-BR" dirty="0" err="1">
+                <a:solidFill>
+                  <a:schemeClr val="bg1"/>
+                </a:solidFill>
+                <a:latin typeface="Arial" panose="020B0604020202020204" pitchFamily="34" charset="0"/>
+                <a:cs typeface="Arial" panose="020B0604020202020204" pitchFamily="34" charset="0"/>
+              </a:rPr>
+              <a:t>facilisis</a:t>
+            </a:r>
+            <a:r>
+              <a:rPr lang="pt-BR" dirty="0">
+                <a:solidFill>
+                  <a:schemeClr val="bg1"/>
+                </a:solidFill>
+                <a:latin typeface="Arial" panose="020B0604020202020204" pitchFamily="34" charset="0"/>
+                <a:cs typeface="Arial" panose="020B0604020202020204" pitchFamily="34" charset="0"/>
+              </a:rPr>
+              <a:t>. </a:t>
+            </a:r>
+            <a:r>
+              <a:rPr lang="pt-BR" dirty="0" err="1">
+                <a:solidFill>
+                  <a:schemeClr val="bg1"/>
+                </a:solidFill>
+                <a:latin typeface="Arial" panose="020B0604020202020204" pitchFamily="34" charset="0"/>
+                <a:cs typeface="Arial" panose="020B0604020202020204" pitchFamily="34" charset="0"/>
+              </a:rPr>
+              <a:t>Proin</a:t>
+            </a:r>
+            <a:r>
+              <a:rPr lang="pt-BR" dirty="0">
+                <a:solidFill>
+                  <a:schemeClr val="bg1"/>
+                </a:solidFill>
+                <a:latin typeface="Arial" panose="020B0604020202020204" pitchFamily="34" charset="0"/>
+                <a:cs typeface="Arial" panose="020B0604020202020204" pitchFamily="34" charset="0"/>
+              </a:rPr>
+              <a:t> a </a:t>
+            </a:r>
+            <a:r>
+              <a:rPr lang="pt-BR" dirty="0" err="1">
+                <a:solidFill>
+                  <a:schemeClr val="bg1"/>
+                </a:solidFill>
+                <a:latin typeface="Arial" panose="020B0604020202020204" pitchFamily="34" charset="0"/>
+                <a:cs typeface="Arial" panose="020B0604020202020204" pitchFamily="34" charset="0"/>
+              </a:rPr>
+              <a:t>fringilla</a:t>
+            </a:r>
+            <a:r>
+              <a:rPr lang="pt-BR" dirty="0">
+                <a:solidFill>
+                  <a:schemeClr val="bg1"/>
+                </a:solidFill>
+                <a:latin typeface="Arial" panose="020B0604020202020204" pitchFamily="34" charset="0"/>
+                <a:cs typeface="Arial" panose="020B0604020202020204" pitchFamily="34" charset="0"/>
+              </a:rPr>
+              <a:t> </a:t>
+            </a:r>
+            <a:r>
+              <a:rPr lang="pt-BR" dirty="0" err="1">
+                <a:solidFill>
+                  <a:schemeClr val="bg1"/>
+                </a:solidFill>
+                <a:latin typeface="Arial" panose="020B0604020202020204" pitchFamily="34" charset="0"/>
+                <a:cs typeface="Arial" panose="020B0604020202020204" pitchFamily="34" charset="0"/>
+              </a:rPr>
+              <a:t>metus</a:t>
+            </a:r>
+            <a:r>
+              <a:rPr lang="pt-BR" dirty="0">
+                <a:solidFill>
+                  <a:schemeClr val="bg1"/>
+                </a:solidFill>
+                <a:latin typeface="Arial" panose="020B0604020202020204" pitchFamily="34" charset="0"/>
+                <a:cs typeface="Arial" panose="020B0604020202020204" pitchFamily="34" charset="0"/>
+              </a:rPr>
+              <a:t>, ac </a:t>
+            </a:r>
+            <a:r>
+              <a:rPr lang="pt-BR" dirty="0" err="1">
+                <a:solidFill>
+                  <a:schemeClr val="bg1"/>
+                </a:solidFill>
+                <a:latin typeface="Arial" panose="020B0604020202020204" pitchFamily="34" charset="0"/>
+                <a:cs typeface="Arial" panose="020B0604020202020204" pitchFamily="34" charset="0"/>
+              </a:rPr>
+              <a:t>vehicula</a:t>
+            </a:r>
+            <a:r>
+              <a:rPr lang="pt-BR" dirty="0">
+                <a:solidFill>
+                  <a:schemeClr val="bg1"/>
+                </a:solidFill>
+                <a:latin typeface="Arial" panose="020B0604020202020204" pitchFamily="34" charset="0"/>
+                <a:cs typeface="Arial" panose="020B0604020202020204" pitchFamily="34" charset="0"/>
+              </a:rPr>
+              <a:t> </a:t>
+            </a:r>
+            <a:r>
+              <a:rPr lang="pt-BR" dirty="0" err="1">
+                <a:solidFill>
+                  <a:schemeClr val="bg1"/>
+                </a:solidFill>
+                <a:latin typeface="Arial" panose="020B0604020202020204" pitchFamily="34" charset="0"/>
+                <a:cs typeface="Arial" panose="020B0604020202020204" pitchFamily="34" charset="0"/>
+              </a:rPr>
+              <a:t>ligula</a:t>
+            </a:r>
+            <a:r>
+              <a:rPr lang="pt-BR" dirty="0">
+                <a:solidFill>
+                  <a:schemeClr val="bg1"/>
+                </a:solidFill>
+                <a:latin typeface="Arial" panose="020B0604020202020204" pitchFamily="34" charset="0"/>
+                <a:cs typeface="Arial" panose="020B0604020202020204" pitchFamily="34" charset="0"/>
+              </a:rPr>
+              <a:t>. </a:t>
+            </a:r>
+            <a:r>
+              <a:rPr lang="pt-BR" dirty="0" err="1">
+                <a:solidFill>
+                  <a:schemeClr val="bg1"/>
+                </a:solidFill>
+                <a:latin typeface="Arial" panose="020B0604020202020204" pitchFamily="34" charset="0"/>
+                <a:cs typeface="Arial" panose="020B0604020202020204" pitchFamily="34" charset="0"/>
+              </a:rPr>
+              <a:t>Integer</a:t>
+            </a:r>
+            <a:r>
+              <a:rPr lang="pt-BR" dirty="0">
+                <a:solidFill>
+                  <a:schemeClr val="bg1"/>
+                </a:solidFill>
+                <a:latin typeface="Arial" panose="020B0604020202020204" pitchFamily="34" charset="0"/>
+                <a:cs typeface="Arial" panose="020B0604020202020204" pitchFamily="34" charset="0"/>
+              </a:rPr>
+              <a:t> </a:t>
+            </a:r>
+            <a:r>
+              <a:rPr lang="pt-BR" dirty="0" err="1">
+                <a:solidFill>
+                  <a:schemeClr val="bg1"/>
+                </a:solidFill>
+                <a:latin typeface="Arial" panose="020B0604020202020204" pitchFamily="34" charset="0"/>
+                <a:cs typeface="Arial" panose="020B0604020202020204" pitchFamily="34" charset="0"/>
+              </a:rPr>
+              <a:t>congue</a:t>
+            </a:r>
+            <a:r>
+              <a:rPr lang="pt-BR" dirty="0">
+                <a:solidFill>
+                  <a:schemeClr val="bg1"/>
+                </a:solidFill>
+                <a:latin typeface="Arial" panose="020B0604020202020204" pitchFamily="34" charset="0"/>
+                <a:cs typeface="Arial" panose="020B0604020202020204" pitchFamily="34" charset="0"/>
+              </a:rPr>
+              <a:t> </a:t>
+            </a:r>
+            <a:r>
+              <a:rPr lang="pt-BR" dirty="0" err="1">
+                <a:solidFill>
+                  <a:schemeClr val="bg1"/>
+                </a:solidFill>
+                <a:latin typeface="Arial" panose="020B0604020202020204" pitchFamily="34" charset="0"/>
+                <a:cs typeface="Arial" panose="020B0604020202020204" pitchFamily="34" charset="0"/>
+              </a:rPr>
+              <a:t>diam</a:t>
+            </a:r>
+            <a:r>
+              <a:rPr lang="pt-BR" dirty="0">
+                <a:solidFill>
+                  <a:schemeClr val="bg1"/>
+                </a:solidFill>
+                <a:latin typeface="Arial" panose="020B0604020202020204" pitchFamily="34" charset="0"/>
+                <a:cs typeface="Arial" panose="020B0604020202020204" pitchFamily="34" charset="0"/>
+              </a:rPr>
+              <a:t> </a:t>
+            </a:r>
+            <a:r>
+              <a:rPr lang="pt-BR" dirty="0" err="1">
+                <a:solidFill>
+                  <a:schemeClr val="bg1"/>
+                </a:solidFill>
+                <a:latin typeface="Arial" panose="020B0604020202020204" pitchFamily="34" charset="0"/>
+                <a:cs typeface="Arial" panose="020B0604020202020204" pitchFamily="34" charset="0"/>
+              </a:rPr>
+              <a:t>neque</a:t>
+            </a:r>
+            <a:r>
+              <a:rPr lang="pt-BR" dirty="0">
+                <a:solidFill>
+                  <a:schemeClr val="bg1"/>
+                </a:solidFill>
+                <a:latin typeface="Arial" panose="020B0604020202020204" pitchFamily="34" charset="0"/>
+                <a:cs typeface="Arial" panose="020B0604020202020204" pitchFamily="34" charset="0"/>
+              </a:rPr>
+              <a:t>, vitae </a:t>
+            </a:r>
+            <a:r>
+              <a:rPr lang="pt-BR" dirty="0" err="1">
+                <a:solidFill>
+                  <a:schemeClr val="bg1"/>
+                </a:solidFill>
+                <a:latin typeface="Arial" panose="020B0604020202020204" pitchFamily="34" charset="0"/>
+                <a:cs typeface="Arial" panose="020B0604020202020204" pitchFamily="34" charset="0"/>
+              </a:rPr>
+              <a:t>viverra</a:t>
+            </a:r>
+            <a:r>
+              <a:rPr lang="pt-BR" dirty="0">
+                <a:solidFill>
+                  <a:schemeClr val="bg1"/>
+                </a:solidFill>
+                <a:latin typeface="Arial" panose="020B0604020202020204" pitchFamily="34" charset="0"/>
+                <a:cs typeface="Arial" panose="020B0604020202020204" pitchFamily="34" charset="0"/>
+              </a:rPr>
+              <a:t> </a:t>
+            </a:r>
+            <a:r>
+              <a:rPr lang="pt-BR" dirty="0" err="1">
+                <a:solidFill>
+                  <a:schemeClr val="bg1"/>
+                </a:solidFill>
+                <a:latin typeface="Arial" panose="020B0604020202020204" pitchFamily="34" charset="0"/>
+                <a:cs typeface="Arial" panose="020B0604020202020204" pitchFamily="34" charset="0"/>
+              </a:rPr>
+              <a:t>arcu</a:t>
+            </a:r>
+            <a:r>
+              <a:rPr lang="pt-BR" dirty="0">
+                <a:solidFill>
+                  <a:schemeClr val="bg1"/>
+                </a:solidFill>
+                <a:latin typeface="Arial" panose="020B0604020202020204" pitchFamily="34" charset="0"/>
+                <a:cs typeface="Arial" panose="020B0604020202020204" pitchFamily="34" charset="0"/>
+              </a:rPr>
+              <a:t> </a:t>
+            </a:r>
+            <a:r>
+              <a:rPr lang="pt-BR" dirty="0" err="1">
+                <a:solidFill>
+                  <a:schemeClr val="bg1"/>
+                </a:solidFill>
+                <a:latin typeface="Arial" panose="020B0604020202020204" pitchFamily="34" charset="0"/>
+                <a:cs typeface="Arial" panose="020B0604020202020204" pitchFamily="34" charset="0"/>
+              </a:rPr>
+              <a:t>iaculis</a:t>
+            </a:r>
+            <a:r>
+              <a:rPr lang="pt-BR" dirty="0">
+                <a:solidFill>
+                  <a:schemeClr val="bg1"/>
+                </a:solidFill>
+                <a:latin typeface="Arial" panose="020B0604020202020204" pitchFamily="34" charset="0"/>
+                <a:cs typeface="Arial" panose="020B0604020202020204" pitchFamily="34" charset="0"/>
+              </a:rPr>
+              <a:t> </a:t>
+            </a:r>
+            <a:r>
+              <a:rPr lang="pt-BR" dirty="0" err="1">
+                <a:solidFill>
+                  <a:schemeClr val="bg1"/>
+                </a:solidFill>
+                <a:latin typeface="Arial" panose="020B0604020202020204" pitchFamily="34" charset="0"/>
+                <a:cs typeface="Arial" panose="020B0604020202020204" pitchFamily="34" charset="0"/>
+              </a:rPr>
+              <a:t>suscipit</a:t>
+            </a:r>
+            <a:r>
+              <a:rPr lang="pt-BR" dirty="0">
+                <a:solidFill>
+                  <a:schemeClr val="bg1"/>
+                </a:solidFill>
+                <a:latin typeface="Arial" panose="020B0604020202020204" pitchFamily="34" charset="0"/>
+                <a:cs typeface="Arial" panose="020B0604020202020204" pitchFamily="34" charset="0"/>
+              </a:rPr>
+              <a:t>. </a:t>
+            </a:r>
+            <a:r>
+              <a:rPr lang="pt-BR" dirty="0" err="1">
+                <a:solidFill>
+                  <a:schemeClr val="bg1"/>
+                </a:solidFill>
+                <a:latin typeface="Arial" panose="020B0604020202020204" pitchFamily="34" charset="0"/>
+                <a:cs typeface="Arial" panose="020B0604020202020204" pitchFamily="34" charset="0"/>
+              </a:rPr>
+              <a:t>Proin</a:t>
+            </a:r>
+            <a:r>
+              <a:rPr lang="pt-BR" dirty="0">
+                <a:solidFill>
+                  <a:schemeClr val="bg1"/>
+                </a:solidFill>
+                <a:latin typeface="Arial" panose="020B0604020202020204" pitchFamily="34" charset="0"/>
+                <a:cs typeface="Arial" panose="020B0604020202020204" pitchFamily="34" charset="0"/>
+              </a:rPr>
+              <a:t> </a:t>
+            </a:r>
+            <a:r>
+              <a:rPr lang="pt-BR" dirty="0" err="1">
+                <a:solidFill>
+                  <a:schemeClr val="bg1"/>
+                </a:solidFill>
+                <a:latin typeface="Arial" panose="020B0604020202020204" pitchFamily="34" charset="0"/>
+                <a:cs typeface="Arial" panose="020B0604020202020204" pitchFamily="34" charset="0"/>
+              </a:rPr>
+              <a:t>volutpat</a:t>
+            </a:r>
+            <a:r>
+              <a:rPr lang="pt-BR" dirty="0">
+                <a:solidFill>
+                  <a:schemeClr val="bg1"/>
+                </a:solidFill>
+                <a:latin typeface="Arial" panose="020B0604020202020204" pitchFamily="34" charset="0"/>
+                <a:cs typeface="Arial" panose="020B0604020202020204" pitchFamily="34" charset="0"/>
+              </a:rPr>
+              <a:t> </a:t>
+            </a:r>
+            <a:r>
+              <a:rPr lang="pt-BR" dirty="0" err="1">
+                <a:solidFill>
+                  <a:schemeClr val="bg1"/>
+                </a:solidFill>
+                <a:latin typeface="Arial" panose="020B0604020202020204" pitchFamily="34" charset="0"/>
+                <a:cs typeface="Arial" panose="020B0604020202020204" pitchFamily="34" charset="0"/>
+              </a:rPr>
+              <a:t>condimentum</a:t>
+            </a:r>
+            <a:r>
+              <a:rPr lang="pt-BR" dirty="0">
+                <a:solidFill>
+                  <a:schemeClr val="bg1"/>
+                </a:solidFill>
+                <a:latin typeface="Arial" panose="020B0604020202020204" pitchFamily="34" charset="0"/>
+                <a:cs typeface="Arial" panose="020B0604020202020204" pitchFamily="34" charset="0"/>
+              </a:rPr>
+              <a:t> </a:t>
+            </a:r>
+            <a:r>
+              <a:rPr lang="pt-BR" dirty="0" err="1">
+                <a:solidFill>
+                  <a:schemeClr val="bg1"/>
+                </a:solidFill>
+                <a:latin typeface="Arial" panose="020B0604020202020204" pitchFamily="34" charset="0"/>
+                <a:cs typeface="Arial" panose="020B0604020202020204" pitchFamily="34" charset="0"/>
+              </a:rPr>
+              <a:t>felis</a:t>
+            </a:r>
+            <a:r>
+              <a:rPr lang="pt-BR" dirty="0">
+                <a:solidFill>
+                  <a:schemeClr val="bg1"/>
+                </a:solidFill>
+                <a:latin typeface="Arial" panose="020B0604020202020204" pitchFamily="34" charset="0"/>
+                <a:cs typeface="Arial" panose="020B0604020202020204" pitchFamily="34" charset="0"/>
+              </a:rPr>
+              <a:t> ut </a:t>
+            </a:r>
+            <a:r>
+              <a:rPr lang="pt-BR" dirty="0" err="1">
+                <a:solidFill>
+                  <a:schemeClr val="bg1"/>
+                </a:solidFill>
+                <a:latin typeface="Arial" panose="020B0604020202020204" pitchFamily="34" charset="0"/>
+                <a:cs typeface="Arial" panose="020B0604020202020204" pitchFamily="34" charset="0"/>
+              </a:rPr>
+              <a:t>fermentum</a:t>
+            </a:r>
+            <a:r>
+              <a:rPr lang="pt-BR" dirty="0">
+                <a:solidFill>
+                  <a:schemeClr val="bg1"/>
+                </a:solidFill>
+                <a:latin typeface="Arial" panose="020B0604020202020204" pitchFamily="34" charset="0"/>
+                <a:cs typeface="Arial" panose="020B0604020202020204" pitchFamily="34" charset="0"/>
+              </a:rPr>
+              <a:t>. </a:t>
+            </a:r>
+          </a:p>
+        </p:txBody>
+      </p:sp>
+      <p:cxnSp>
+        <p:nvCxnSpPr>
+          <p:cNvPr id="17" name="Conector reto 16">
+            <a:extLst>
+              <a:ext uri="{FF2B5EF4-FFF2-40B4-BE49-F238E27FC236}">
+                <a16:creationId xmlns:a16="http://schemas.microsoft.com/office/drawing/2014/main" id="{B5E62DE5-8A43-4512-A17C-1D6610F95F9D}"/>
+              </a:ext>
+            </a:extLst>
+          </p:cNvPr>
+          <p:cNvCxnSpPr/>
+          <p:nvPr/>
+        </p:nvCxnSpPr>
+        <p:spPr>
+          <a:xfrm>
+            <a:off x="6115284" y="2907160"/>
+            <a:ext cx="834887" cy="0"/>
+          </a:xfrm>
+          <a:prstGeom prst="line">
+            <a:avLst/>
+          </a:prstGeom>
+          <a:ln w="25400">
+            <a:solidFill>
+              <a:srgbClr val="00B0F0"/>
+            </a:solidFill>
+          </a:ln>
+        </p:spPr>
+        <p:style>
+          <a:lnRef idx="1">
+            <a:schemeClr val="accent1"/>
+          </a:lnRef>
+          <a:fillRef idx="0">
+            <a:schemeClr val="accent1"/>
+          </a:fillRef>
+          <a:effectRef idx="0">
+            <a:schemeClr val="accent1"/>
+          </a:effectRef>
+          <a:fontRef idx="minor">
+            <a:schemeClr val="tx1"/>
+          </a:fontRef>
+        </p:style>
+      </p:cxnSp>
+      <p:sp>
+        <p:nvSpPr>
+          <p:cNvPr id="11" name="Retângulo: Cantos Arredondados 10">
+            <a:extLst>
+              <a:ext uri="{FF2B5EF4-FFF2-40B4-BE49-F238E27FC236}">
+                <a16:creationId xmlns:a16="http://schemas.microsoft.com/office/drawing/2014/main" id="{A43B7241-81E7-4544-A1E5-5F949984AA9C}"/>
+              </a:ext>
+            </a:extLst>
+          </p:cNvPr>
+          <p:cNvSpPr/>
+          <p:nvPr/>
+        </p:nvSpPr>
+        <p:spPr>
+          <a:xfrm>
+            <a:off x="8007874" y="794990"/>
+            <a:ext cx="2660126" cy="5268020"/>
+          </a:xfrm>
+          <a:prstGeom prst="roundRect">
+            <a:avLst/>
+          </a:prstGeom>
+          <a:solidFill>
+            <a:schemeClr val="tx1">
+              <a:lumMod val="75000"/>
+              <a:lumOff val="25000"/>
+            </a:schemeClr>
+          </a:solidFill>
+        </p:spPr>
+        <p:style>
+          <a:lnRef idx="2">
+            <a:schemeClr val="accent1">
+              <a:shade val="50000"/>
+            </a:schemeClr>
+          </a:lnRef>
+          <a:fillRef idx="1">
+            <a:schemeClr val="accent1"/>
+          </a:fillRef>
+          <a:effectRef idx="0">
+            <a:schemeClr val="accent1"/>
+          </a:effectRef>
+          <a:fontRef idx="minor">
+            <a:schemeClr val="lt1"/>
+          </a:fontRef>
+        </p:style>
+        <p:txBody>
+          <a:bodyPr rtlCol="0" anchor="ctr"/>
+          <a:lstStyle/>
+          <a:p>
+            <a:pPr algn="ctr"/>
+            <a:r>
+              <a:rPr lang="pt-BR" dirty="0"/>
+              <a:t>      </a:t>
+            </a:r>
+          </a:p>
+        </p:txBody>
+      </p:sp>
+      <p:pic>
+        <p:nvPicPr>
+          <p:cNvPr id="6" name="Picture 4" descr="Iphone X Screen Mockup transparent PNG - StickPNG">
+            <a:extLst>
+              <a:ext uri="{FF2B5EF4-FFF2-40B4-BE49-F238E27FC236}">
+                <a16:creationId xmlns:a16="http://schemas.microsoft.com/office/drawing/2014/main" id="{6717C9EB-C016-46C8-8CBD-6DFE3322966A}"/>
+              </a:ext>
+            </a:extLst>
+          </p:cNvPr>
+          <p:cNvPicPr>
+            <a:picLocks noChangeAspect="1" noChangeArrowheads="1"/>
+          </p:cNvPicPr>
+          <p:nvPr/>
+        </p:nvPicPr>
+        <p:blipFill>
+          <a:blip r:embed="rId2">
+            <a:extLst>
+              <a:ext uri="{28A0092B-C50C-407E-A947-70E740481C1C}">
+                <a14:useLocalDpi xmlns:a14="http://schemas.microsoft.com/office/drawing/2010/main" val="0"/>
+              </a:ext>
+            </a:extLst>
+          </a:blip>
+          <a:srcRect/>
+          <a:stretch>
+            <a:fillRect/>
+          </a:stretch>
+        </p:blipFill>
+        <p:spPr bwMode="auto">
+          <a:xfrm>
+            <a:off x="6376663" y="787005"/>
+            <a:ext cx="5991374" cy="5552372"/>
+          </a:xfrm>
+          <a:prstGeom prst="rect">
+            <a:avLst/>
+          </a:prstGeom>
+          <a:noFill/>
+          <a:extLst>
+            <a:ext uri="{909E8E84-426E-40DD-AFC4-6F175D3DCCD1}">
+              <a14:hiddenFill xmlns:a14="http://schemas.microsoft.com/office/drawing/2010/main">
+                <a:solidFill>
+                  <a:srgbClr val="FFFFFF"/>
+                </a:solidFill>
+              </a14:hiddenFill>
+            </a:ext>
+          </a:extLst>
+        </p:spPr>
+      </p:pic>
+      <p:pic>
+        <p:nvPicPr>
+          <p:cNvPr id="14" name="Imagem 13" descr="Homem de terno e gravata&#10;&#10;Descrição gerada automaticamente">
+            <a:extLst>
+              <a:ext uri="{FF2B5EF4-FFF2-40B4-BE49-F238E27FC236}">
+                <a16:creationId xmlns:a16="http://schemas.microsoft.com/office/drawing/2014/main" id="{640D9F2C-510A-4648-8686-8824764EFD37}"/>
+              </a:ext>
+            </a:extLst>
+          </p:cNvPr>
+          <p:cNvPicPr>
+            <a:picLocks noChangeAspect="1"/>
+          </p:cNvPicPr>
+          <p:nvPr/>
+        </p:nvPicPr>
+        <p:blipFill>
+          <a:blip r:embed="rId3">
+            <a:extLst>
+              <a:ext uri="{28A0092B-C50C-407E-A947-70E740481C1C}">
+                <a14:useLocalDpi xmlns:a14="http://schemas.microsoft.com/office/drawing/2010/main" val="0"/>
+              </a:ext>
+            </a:extLst>
+          </a:blip>
+          <a:stretch>
+            <a:fillRect/>
+          </a:stretch>
+        </p:blipFill>
+        <p:spPr>
+          <a:xfrm>
+            <a:off x="8748855" y="1687151"/>
+            <a:ext cx="1178164" cy="1172480"/>
+          </a:xfrm>
+          <a:prstGeom prst="ellipse">
+            <a:avLst/>
+          </a:prstGeom>
+          <a:ln w="63500" cap="rnd">
+            <a:noFill/>
+          </a:ln>
+          <a:effectLst/>
+          <a:scene3d>
+            <a:camera prst="orthographicFront"/>
+            <a:lightRig rig="contrasting" dir="t">
+              <a:rot lat="0" lon="0" rev="3000000"/>
+            </a:lightRig>
+          </a:scene3d>
+          <a:sp3d contourW="7620">
+            <a:bevelT w="95250" h="31750"/>
+            <a:contourClr>
+              <a:srgbClr val="333333"/>
+            </a:contourClr>
+          </a:sp3d>
+        </p:spPr>
+      </p:pic>
+      <p:sp>
+        <p:nvSpPr>
+          <p:cNvPr id="12" name="Retângulo 11">
+            <a:extLst>
+              <a:ext uri="{FF2B5EF4-FFF2-40B4-BE49-F238E27FC236}">
+                <a16:creationId xmlns:a16="http://schemas.microsoft.com/office/drawing/2014/main" id="{3CE46A40-A4BB-4EA5-9BF2-E23A9A995319}"/>
+              </a:ext>
+            </a:extLst>
+          </p:cNvPr>
+          <p:cNvSpPr/>
+          <p:nvPr/>
+        </p:nvSpPr>
+        <p:spPr>
+          <a:xfrm>
+            <a:off x="8488315" y="1234280"/>
+            <a:ext cx="1629420" cy="369332"/>
+          </a:xfrm>
+          <a:prstGeom prst="rect">
+            <a:avLst/>
+          </a:prstGeom>
+        </p:spPr>
+        <p:txBody>
+          <a:bodyPr wrap="none">
+            <a:spAutoFit/>
+          </a:bodyPr>
+          <a:lstStyle/>
+          <a:p>
+            <a:pPr algn="ctr"/>
+            <a:r>
+              <a:rPr lang="pt-BR" b="1" dirty="0">
+                <a:solidFill>
+                  <a:schemeClr val="bg1"/>
+                </a:solidFill>
+              </a:rPr>
+              <a:t>Antônio Inácio </a:t>
+            </a:r>
+          </a:p>
+        </p:txBody>
+      </p:sp>
+    </p:spTree>
+    <p:extLst>
+      <p:ext uri="{BB962C8B-B14F-4D97-AF65-F5344CB8AC3E}">
+        <p14:creationId xmlns:p14="http://schemas.microsoft.com/office/powerpoint/2010/main" val="92957997"/>
+      </p:ext>
+    </p:extLst>
+  </p:cSld>
+  <p:clrMapOvr>
+    <a:masterClrMapping/>
+  </p:clrMapOvr>
+</p:sld>
+</file>
+
+<file path=ppt/slides/slide5.xml><?xml version="1.0" encoding="utf-8"?>
+<p:sld xmlns:a="http://schemas.openxmlformats.org/drawingml/2006/main" xmlns:r="http://schemas.openxmlformats.org/officeDocument/2006/relationships" xmlns:p="http://schemas.openxmlformats.org/presentationml/2006/main">
+  <p:cSld>
+    <p:spTree>
+      <p:nvGrpSpPr>
+        <p:cNvPr id="1" name=""/>
+        <p:cNvGrpSpPr/>
+        <p:nvPr/>
+      </p:nvGrpSpPr>
+      <p:grpSpPr>
+        <a:xfrm>
+          <a:off x="0" y="0"/>
+          <a:ext cx="0" cy="0"/>
+          <a:chOff x="0" y="0"/>
+          <a:chExt cx="0" cy="0"/>
+        </a:xfrm>
+      </p:grpSpPr>
+      <p:sp>
+        <p:nvSpPr>
+          <p:cNvPr id="2" name="Título 1">
+            <a:extLst>
+              <a:ext uri="{FF2B5EF4-FFF2-40B4-BE49-F238E27FC236}">
+                <a16:creationId xmlns:a16="http://schemas.microsoft.com/office/drawing/2014/main" id="{7A11EE29-D9B2-4A05-A636-FABA653A1F40}"/>
+              </a:ext>
+            </a:extLst>
+          </p:cNvPr>
+          <p:cNvSpPr>
+            <a:spLocks noGrp="1"/>
+          </p:cNvSpPr>
+          <p:nvPr>
+            <p:ph type="ctrTitle"/>
+          </p:nvPr>
+        </p:nvSpPr>
+        <p:spPr/>
+        <p:txBody>
+          <a:bodyPr/>
+          <a:lstStyle/>
+          <a:p>
+            <a:endParaRPr lang="pt-BR"/>
+          </a:p>
+        </p:txBody>
+      </p:sp>
+      <p:sp>
+        <p:nvSpPr>
+          <p:cNvPr id="3" name="Subtítulo 2">
+            <a:extLst>
+              <a:ext uri="{FF2B5EF4-FFF2-40B4-BE49-F238E27FC236}">
+                <a16:creationId xmlns:a16="http://schemas.microsoft.com/office/drawing/2014/main" id="{7D1C3AF2-7435-4FE8-A0E7-DC05DB9E6C1A}"/>
+              </a:ext>
+            </a:extLst>
+          </p:cNvPr>
+          <p:cNvSpPr>
+            <a:spLocks noGrp="1"/>
+          </p:cNvSpPr>
+          <p:nvPr>
+            <p:ph type="subTitle" idx="1"/>
+          </p:nvPr>
+        </p:nvSpPr>
+        <p:spPr/>
+        <p:txBody>
+          <a:bodyPr/>
+          <a:lstStyle/>
+          <a:p>
+            <a:endParaRPr lang="pt-BR"/>
+          </a:p>
+        </p:txBody>
+      </p:sp>
+      <p:sp>
+        <p:nvSpPr>
+          <p:cNvPr id="4" name="Retângulo 3">
+            <a:extLst>
+              <a:ext uri="{FF2B5EF4-FFF2-40B4-BE49-F238E27FC236}">
+                <a16:creationId xmlns:a16="http://schemas.microsoft.com/office/drawing/2014/main" id="{A10BB73B-13C5-4F92-845A-BFB7C32C3C64}"/>
+              </a:ext>
+            </a:extLst>
+          </p:cNvPr>
+          <p:cNvSpPr/>
+          <p:nvPr/>
+        </p:nvSpPr>
+        <p:spPr>
+          <a:xfrm>
             <a:off x="2888975" y="0"/>
             <a:ext cx="9303026" cy="6858000"/>
           </a:xfrm>
@@ -5387,14 +7693,20 @@
           <a:lstStyle/>
           <a:p>
             <a:r>
-              <a:rPr lang="pt-BR" sz="4000" dirty="0">
+              <a:rPr lang="pt-BR" sz="4000" dirty="0" err="1">
                 <a:solidFill>
                   <a:schemeClr val="bg1"/>
                 </a:solidFill>
                 <a:latin typeface="POLYA Regular" panose="00000500000000000000" pitchFamily="50" charset="0"/>
               </a:rPr>
-              <a:t>SOBRE</a:t>
-            </a:r>
+              <a:t>soluçao</a:t>
+            </a:r>
+            <a:endParaRPr lang="pt-BR" sz="4000" dirty="0">
+              <a:solidFill>
+                <a:schemeClr val="bg1"/>
+              </a:solidFill>
+              <a:latin typeface="POLYA Regular" panose="00000500000000000000" pitchFamily="50" charset="0"/>
+            </a:endParaRPr>
           </a:p>
         </p:txBody>
       </p:sp>
@@ -6516,6 +8828,1350 @@
     <p:extLst>
       <p:ext uri="{BB962C8B-B14F-4D97-AF65-F5344CB8AC3E}">
         <p14:creationId xmlns:p14="http://schemas.microsoft.com/office/powerpoint/2010/main" val="344848806"/>
+      </p:ext>
+    </p:extLst>
+  </p:cSld>
+  <p:clrMapOvr>
+    <a:masterClrMapping/>
+  </p:clrMapOvr>
+</p:sld>
+</file>
+
+<file path=ppt/slides/slide6.xml><?xml version="1.0" encoding="utf-8"?>
+<p:sld xmlns:a="http://schemas.openxmlformats.org/drawingml/2006/main" xmlns:r="http://schemas.openxmlformats.org/officeDocument/2006/relationships" xmlns:p="http://schemas.openxmlformats.org/presentationml/2006/main">
+  <p:cSld>
+    <p:spTree>
+      <p:nvGrpSpPr>
+        <p:cNvPr id="1" name=""/>
+        <p:cNvGrpSpPr/>
+        <p:nvPr/>
+      </p:nvGrpSpPr>
+      <p:grpSpPr>
+        <a:xfrm>
+          <a:off x="0" y="0"/>
+          <a:ext cx="0" cy="0"/>
+          <a:chOff x="0" y="0"/>
+          <a:chExt cx="0" cy="0"/>
+        </a:xfrm>
+      </p:grpSpPr>
+      <p:sp>
+        <p:nvSpPr>
+          <p:cNvPr id="2" name="Título 1">
+            <a:extLst>
+              <a:ext uri="{FF2B5EF4-FFF2-40B4-BE49-F238E27FC236}">
+                <a16:creationId xmlns:a16="http://schemas.microsoft.com/office/drawing/2014/main" id="{7A11EE29-D9B2-4A05-A636-FABA653A1F40}"/>
+              </a:ext>
+            </a:extLst>
+          </p:cNvPr>
+          <p:cNvSpPr>
+            <a:spLocks noGrp="1"/>
+          </p:cNvSpPr>
+          <p:nvPr>
+            <p:ph type="ctrTitle"/>
+          </p:nvPr>
+        </p:nvSpPr>
+        <p:spPr/>
+        <p:txBody>
+          <a:bodyPr/>
+          <a:lstStyle/>
+          <a:p>
+            <a:endParaRPr lang="pt-BR"/>
+          </a:p>
+        </p:txBody>
+      </p:sp>
+      <p:sp>
+        <p:nvSpPr>
+          <p:cNvPr id="3" name="Subtítulo 2">
+            <a:extLst>
+              <a:ext uri="{FF2B5EF4-FFF2-40B4-BE49-F238E27FC236}">
+                <a16:creationId xmlns:a16="http://schemas.microsoft.com/office/drawing/2014/main" id="{7D1C3AF2-7435-4FE8-A0E7-DC05DB9E6C1A}"/>
+              </a:ext>
+            </a:extLst>
+          </p:cNvPr>
+          <p:cNvSpPr>
+            <a:spLocks noGrp="1"/>
+          </p:cNvSpPr>
+          <p:nvPr>
+            <p:ph type="subTitle" idx="1"/>
+          </p:nvPr>
+        </p:nvSpPr>
+        <p:spPr/>
+        <p:txBody>
+          <a:bodyPr/>
+          <a:lstStyle/>
+          <a:p>
+            <a:endParaRPr lang="pt-BR"/>
+          </a:p>
+        </p:txBody>
+      </p:sp>
+      <p:sp>
+        <p:nvSpPr>
+          <p:cNvPr id="4" name="Retângulo 3">
+            <a:extLst>
+              <a:ext uri="{FF2B5EF4-FFF2-40B4-BE49-F238E27FC236}">
+                <a16:creationId xmlns:a16="http://schemas.microsoft.com/office/drawing/2014/main" id="{A10BB73B-13C5-4F92-845A-BFB7C32C3C64}"/>
+              </a:ext>
+            </a:extLst>
+          </p:cNvPr>
+          <p:cNvSpPr/>
+          <p:nvPr/>
+        </p:nvSpPr>
+        <p:spPr>
+          <a:xfrm>
+            <a:off x="2888975" y="0"/>
+            <a:ext cx="9303026" cy="6858000"/>
+          </a:xfrm>
+          <a:prstGeom prst="rect">
+            <a:avLst/>
+          </a:prstGeom>
+          <a:solidFill>
+            <a:schemeClr val="tx2">
+              <a:lumMod val="75000"/>
+            </a:schemeClr>
+          </a:solidFill>
+        </p:spPr>
+        <p:style>
+          <a:lnRef idx="2">
+            <a:schemeClr val="accent1">
+              <a:shade val="50000"/>
+            </a:schemeClr>
+          </a:lnRef>
+          <a:fillRef idx="1">
+            <a:schemeClr val="accent1"/>
+          </a:fillRef>
+          <a:effectRef idx="0">
+            <a:schemeClr val="accent1"/>
+          </a:effectRef>
+          <a:fontRef idx="minor">
+            <a:schemeClr val="lt1"/>
+          </a:fontRef>
+        </p:style>
+        <p:txBody>
+          <a:bodyPr rtlCol="0" anchor="ctr"/>
+          <a:lstStyle/>
+          <a:p>
+            <a:endParaRPr lang="pt-BR" b="1" dirty="0">
+              <a:solidFill>
+                <a:schemeClr val="bg1"/>
+              </a:solidFill>
+              <a:latin typeface="Arial" panose="020B0604020202020204" pitchFamily="34" charset="0"/>
+              <a:cs typeface="Arial" panose="020B0604020202020204" pitchFamily="34" charset="0"/>
+            </a:endParaRPr>
+          </a:p>
+        </p:txBody>
+      </p:sp>
+      <p:sp>
+        <p:nvSpPr>
+          <p:cNvPr id="8" name="Retângulo 7">
+            <a:extLst>
+              <a:ext uri="{FF2B5EF4-FFF2-40B4-BE49-F238E27FC236}">
+                <a16:creationId xmlns:a16="http://schemas.microsoft.com/office/drawing/2014/main" id="{2FCAD7BC-2284-425E-8754-BC24B1747BD9}"/>
+              </a:ext>
+            </a:extLst>
+          </p:cNvPr>
+          <p:cNvSpPr/>
+          <p:nvPr/>
+        </p:nvSpPr>
+        <p:spPr>
+          <a:xfrm>
+            <a:off x="0" y="0"/>
+            <a:ext cx="2888975" cy="6858000"/>
+          </a:xfrm>
+          <a:prstGeom prst="rect">
+            <a:avLst/>
+          </a:prstGeom>
+          <a:solidFill>
+            <a:srgbClr val="0070C0"/>
+          </a:solidFill>
+        </p:spPr>
+        <p:style>
+          <a:lnRef idx="2">
+            <a:schemeClr val="accent1">
+              <a:shade val="50000"/>
+            </a:schemeClr>
+          </a:lnRef>
+          <a:fillRef idx="1">
+            <a:schemeClr val="accent1"/>
+          </a:fillRef>
+          <a:effectRef idx="0">
+            <a:schemeClr val="accent1"/>
+          </a:effectRef>
+          <a:fontRef idx="minor">
+            <a:schemeClr val="lt1"/>
+          </a:fontRef>
+        </p:style>
+        <p:txBody>
+          <a:bodyPr rtlCol="0" anchor="ctr"/>
+          <a:lstStyle/>
+          <a:p>
+            <a:endParaRPr lang="pt-BR" b="1" dirty="0">
+              <a:solidFill>
+                <a:schemeClr val="bg1"/>
+              </a:solidFill>
+              <a:latin typeface="Arial" panose="020B0604020202020204" pitchFamily="34" charset="0"/>
+              <a:cs typeface="Arial" panose="020B0604020202020204" pitchFamily="34" charset="0"/>
+            </a:endParaRPr>
+          </a:p>
+        </p:txBody>
+      </p:sp>
+      <p:sp>
+        <p:nvSpPr>
+          <p:cNvPr id="5" name="CaixaDeTexto 4">
+            <a:extLst>
+              <a:ext uri="{FF2B5EF4-FFF2-40B4-BE49-F238E27FC236}">
+                <a16:creationId xmlns:a16="http://schemas.microsoft.com/office/drawing/2014/main" id="{9D0108FE-3AE4-4C97-BAEA-C9907C60FA98}"/>
+              </a:ext>
+            </a:extLst>
+          </p:cNvPr>
+          <p:cNvSpPr txBox="1"/>
+          <p:nvPr/>
+        </p:nvSpPr>
+        <p:spPr>
+          <a:xfrm>
+            <a:off x="4929810" y="2052709"/>
+            <a:ext cx="5857461" cy="707886"/>
+          </a:xfrm>
+          <a:prstGeom prst="rect">
+            <a:avLst/>
+          </a:prstGeom>
+          <a:noFill/>
+        </p:spPr>
+        <p:txBody>
+          <a:bodyPr wrap="square" rtlCol="0">
+            <a:spAutoFit/>
+          </a:bodyPr>
+          <a:lstStyle/>
+          <a:p>
+            <a:r>
+              <a:rPr lang="pt-BR" sz="4000" dirty="0">
+                <a:solidFill>
+                  <a:schemeClr val="bg1"/>
+                </a:solidFill>
+                <a:latin typeface="POLYA Regular" panose="00000500000000000000" pitchFamily="50" charset="0"/>
+              </a:rPr>
+              <a:t>PRODUTO</a:t>
+            </a:r>
+          </a:p>
+        </p:txBody>
+      </p:sp>
+      <p:sp>
+        <p:nvSpPr>
+          <p:cNvPr id="15" name="Retângulo 14">
+            <a:extLst>
+              <a:ext uri="{FF2B5EF4-FFF2-40B4-BE49-F238E27FC236}">
+                <a16:creationId xmlns:a16="http://schemas.microsoft.com/office/drawing/2014/main" id="{1F878B66-142E-490A-8E45-3D187F0CAE54}"/>
+              </a:ext>
+            </a:extLst>
+          </p:cNvPr>
+          <p:cNvSpPr/>
+          <p:nvPr/>
+        </p:nvSpPr>
+        <p:spPr>
+          <a:xfrm>
+            <a:off x="11211340" y="168566"/>
+            <a:ext cx="741347" cy="83226"/>
+          </a:xfrm>
+          <a:prstGeom prst="rect">
+            <a:avLst/>
+          </a:prstGeom>
+          <a:solidFill>
+            <a:srgbClr val="00B0F0"/>
+          </a:solidFill>
+          <a:ln w="38100">
+            <a:solidFill>
+              <a:srgbClr val="00B0F0"/>
+            </a:solidFill>
+          </a:ln>
+          <a:effectLst/>
+        </p:spPr>
+        <p:style>
+          <a:lnRef idx="2">
+            <a:schemeClr val="accent1">
+              <a:shade val="50000"/>
+            </a:schemeClr>
+          </a:lnRef>
+          <a:fillRef idx="1">
+            <a:schemeClr val="accent1"/>
+          </a:fillRef>
+          <a:effectRef idx="0">
+            <a:schemeClr val="accent1"/>
+          </a:effectRef>
+          <a:fontRef idx="minor">
+            <a:schemeClr val="lt1"/>
+          </a:fontRef>
+        </p:style>
+        <p:txBody>
+          <a:bodyPr rtlCol="0" anchor="ctr"/>
+          <a:lstStyle/>
+          <a:p>
+            <a:pPr algn="ctr"/>
+            <a:endParaRPr lang="pt-BR"/>
+          </a:p>
+        </p:txBody>
+      </p:sp>
+      <p:sp>
+        <p:nvSpPr>
+          <p:cNvPr id="13" name="CaixaDeTexto 12">
+            <a:extLst>
+              <a:ext uri="{FF2B5EF4-FFF2-40B4-BE49-F238E27FC236}">
+                <a16:creationId xmlns:a16="http://schemas.microsoft.com/office/drawing/2014/main" id="{D663E68C-D2F4-4DEE-8511-FDB820843F74}"/>
+              </a:ext>
+            </a:extLst>
+          </p:cNvPr>
+          <p:cNvSpPr txBox="1"/>
+          <p:nvPr/>
+        </p:nvSpPr>
+        <p:spPr>
+          <a:xfrm>
+            <a:off x="4929810" y="3478164"/>
+            <a:ext cx="5592417" cy="2308324"/>
+          </a:xfrm>
+          <a:prstGeom prst="rect">
+            <a:avLst/>
+          </a:prstGeom>
+          <a:noFill/>
+        </p:spPr>
+        <p:txBody>
+          <a:bodyPr wrap="square" rtlCol="0">
+            <a:spAutoFit/>
+          </a:bodyPr>
+          <a:lstStyle/>
+          <a:p>
+            <a:r>
+              <a:rPr lang="pt-BR" dirty="0" err="1">
+                <a:solidFill>
+                  <a:schemeClr val="bg1"/>
+                </a:solidFill>
+                <a:latin typeface="Arial" panose="020B0604020202020204" pitchFamily="34" charset="0"/>
+                <a:cs typeface="Arial" panose="020B0604020202020204" pitchFamily="34" charset="0"/>
+              </a:rPr>
+              <a:t>Lorem</a:t>
+            </a:r>
+            <a:r>
+              <a:rPr lang="pt-BR" dirty="0">
+                <a:solidFill>
+                  <a:schemeClr val="bg1"/>
+                </a:solidFill>
+                <a:latin typeface="Arial" panose="020B0604020202020204" pitchFamily="34" charset="0"/>
+                <a:cs typeface="Arial" panose="020B0604020202020204" pitchFamily="34" charset="0"/>
+              </a:rPr>
+              <a:t> ipsum </a:t>
+            </a:r>
+            <a:r>
+              <a:rPr lang="pt-BR" dirty="0" err="1">
+                <a:solidFill>
+                  <a:schemeClr val="bg1"/>
+                </a:solidFill>
+                <a:latin typeface="Arial" panose="020B0604020202020204" pitchFamily="34" charset="0"/>
+                <a:cs typeface="Arial" panose="020B0604020202020204" pitchFamily="34" charset="0"/>
+              </a:rPr>
+              <a:t>dolor</a:t>
+            </a:r>
+            <a:r>
+              <a:rPr lang="pt-BR" dirty="0">
+                <a:solidFill>
+                  <a:schemeClr val="bg1"/>
+                </a:solidFill>
+                <a:latin typeface="Arial" panose="020B0604020202020204" pitchFamily="34" charset="0"/>
+                <a:cs typeface="Arial" panose="020B0604020202020204" pitchFamily="34" charset="0"/>
+              </a:rPr>
+              <a:t> </a:t>
+            </a:r>
+            <a:r>
+              <a:rPr lang="pt-BR" dirty="0" err="1">
+                <a:solidFill>
+                  <a:schemeClr val="bg1"/>
+                </a:solidFill>
+                <a:latin typeface="Arial" panose="020B0604020202020204" pitchFamily="34" charset="0"/>
+                <a:cs typeface="Arial" panose="020B0604020202020204" pitchFamily="34" charset="0"/>
+              </a:rPr>
+              <a:t>sit</a:t>
+            </a:r>
+            <a:r>
+              <a:rPr lang="pt-BR" dirty="0">
+                <a:solidFill>
+                  <a:schemeClr val="bg1"/>
+                </a:solidFill>
+                <a:latin typeface="Arial" panose="020B0604020202020204" pitchFamily="34" charset="0"/>
+                <a:cs typeface="Arial" panose="020B0604020202020204" pitchFamily="34" charset="0"/>
+              </a:rPr>
+              <a:t> </a:t>
+            </a:r>
+            <a:r>
+              <a:rPr lang="pt-BR" dirty="0" err="1">
+                <a:solidFill>
+                  <a:schemeClr val="bg1"/>
+                </a:solidFill>
+                <a:latin typeface="Arial" panose="020B0604020202020204" pitchFamily="34" charset="0"/>
+                <a:cs typeface="Arial" panose="020B0604020202020204" pitchFamily="34" charset="0"/>
+              </a:rPr>
+              <a:t>amet</a:t>
+            </a:r>
+            <a:r>
+              <a:rPr lang="pt-BR" dirty="0">
+                <a:solidFill>
+                  <a:schemeClr val="bg1"/>
+                </a:solidFill>
+                <a:latin typeface="Arial" panose="020B0604020202020204" pitchFamily="34" charset="0"/>
+                <a:cs typeface="Arial" panose="020B0604020202020204" pitchFamily="34" charset="0"/>
+              </a:rPr>
+              <a:t>, </a:t>
+            </a:r>
+            <a:r>
+              <a:rPr lang="pt-BR" dirty="0" err="1">
+                <a:solidFill>
+                  <a:schemeClr val="bg1"/>
+                </a:solidFill>
+                <a:latin typeface="Arial" panose="020B0604020202020204" pitchFamily="34" charset="0"/>
+                <a:cs typeface="Arial" panose="020B0604020202020204" pitchFamily="34" charset="0"/>
+              </a:rPr>
+              <a:t>consectetur</a:t>
+            </a:r>
+            <a:r>
+              <a:rPr lang="pt-BR" dirty="0">
+                <a:solidFill>
+                  <a:schemeClr val="bg1"/>
+                </a:solidFill>
+                <a:latin typeface="Arial" panose="020B0604020202020204" pitchFamily="34" charset="0"/>
+                <a:cs typeface="Arial" panose="020B0604020202020204" pitchFamily="34" charset="0"/>
+              </a:rPr>
+              <a:t> </a:t>
+            </a:r>
+            <a:r>
+              <a:rPr lang="pt-BR" dirty="0" err="1">
+                <a:solidFill>
+                  <a:schemeClr val="bg1"/>
+                </a:solidFill>
+                <a:latin typeface="Arial" panose="020B0604020202020204" pitchFamily="34" charset="0"/>
+                <a:cs typeface="Arial" panose="020B0604020202020204" pitchFamily="34" charset="0"/>
+              </a:rPr>
+              <a:t>adipiscing</a:t>
+            </a:r>
+            <a:r>
+              <a:rPr lang="pt-BR" dirty="0">
+                <a:solidFill>
+                  <a:schemeClr val="bg1"/>
+                </a:solidFill>
+                <a:latin typeface="Arial" panose="020B0604020202020204" pitchFamily="34" charset="0"/>
+                <a:cs typeface="Arial" panose="020B0604020202020204" pitchFamily="34" charset="0"/>
+              </a:rPr>
+              <a:t> </a:t>
+            </a:r>
+            <a:r>
+              <a:rPr lang="pt-BR" dirty="0" err="1">
+                <a:solidFill>
+                  <a:schemeClr val="bg1"/>
+                </a:solidFill>
+                <a:latin typeface="Arial" panose="020B0604020202020204" pitchFamily="34" charset="0"/>
+                <a:cs typeface="Arial" panose="020B0604020202020204" pitchFamily="34" charset="0"/>
+              </a:rPr>
+              <a:t>elit</a:t>
+            </a:r>
+            <a:r>
+              <a:rPr lang="pt-BR" dirty="0">
+                <a:solidFill>
+                  <a:schemeClr val="bg1"/>
+                </a:solidFill>
+                <a:latin typeface="Arial" panose="020B0604020202020204" pitchFamily="34" charset="0"/>
+                <a:cs typeface="Arial" panose="020B0604020202020204" pitchFamily="34" charset="0"/>
+              </a:rPr>
+              <a:t>. </a:t>
+            </a:r>
+            <a:r>
+              <a:rPr lang="pt-BR" dirty="0" err="1">
+                <a:solidFill>
+                  <a:schemeClr val="bg1"/>
+                </a:solidFill>
+                <a:latin typeface="Arial" panose="020B0604020202020204" pitchFamily="34" charset="0"/>
+                <a:cs typeface="Arial" panose="020B0604020202020204" pitchFamily="34" charset="0"/>
+              </a:rPr>
+              <a:t>Sed</a:t>
+            </a:r>
+            <a:r>
+              <a:rPr lang="pt-BR" dirty="0">
+                <a:solidFill>
+                  <a:schemeClr val="bg1"/>
+                </a:solidFill>
+                <a:latin typeface="Arial" panose="020B0604020202020204" pitchFamily="34" charset="0"/>
+                <a:cs typeface="Arial" panose="020B0604020202020204" pitchFamily="34" charset="0"/>
+              </a:rPr>
+              <a:t> in </a:t>
+            </a:r>
+            <a:r>
+              <a:rPr lang="pt-BR" dirty="0" err="1">
+                <a:solidFill>
+                  <a:schemeClr val="bg1"/>
+                </a:solidFill>
+                <a:latin typeface="Arial" panose="020B0604020202020204" pitchFamily="34" charset="0"/>
+                <a:cs typeface="Arial" panose="020B0604020202020204" pitchFamily="34" charset="0"/>
+              </a:rPr>
+              <a:t>maximus</a:t>
+            </a:r>
+            <a:r>
+              <a:rPr lang="pt-BR" dirty="0">
+                <a:solidFill>
+                  <a:schemeClr val="bg1"/>
+                </a:solidFill>
+                <a:latin typeface="Arial" panose="020B0604020202020204" pitchFamily="34" charset="0"/>
+                <a:cs typeface="Arial" panose="020B0604020202020204" pitchFamily="34" charset="0"/>
+              </a:rPr>
+              <a:t> </a:t>
+            </a:r>
+            <a:r>
+              <a:rPr lang="pt-BR" dirty="0" err="1">
+                <a:solidFill>
+                  <a:schemeClr val="bg1"/>
+                </a:solidFill>
+                <a:latin typeface="Arial" panose="020B0604020202020204" pitchFamily="34" charset="0"/>
+                <a:cs typeface="Arial" panose="020B0604020202020204" pitchFamily="34" charset="0"/>
+              </a:rPr>
+              <a:t>dui</a:t>
+            </a:r>
+            <a:r>
+              <a:rPr lang="pt-BR" dirty="0">
+                <a:solidFill>
+                  <a:schemeClr val="bg1"/>
+                </a:solidFill>
+                <a:latin typeface="Arial" panose="020B0604020202020204" pitchFamily="34" charset="0"/>
+                <a:cs typeface="Arial" panose="020B0604020202020204" pitchFamily="34" charset="0"/>
+              </a:rPr>
+              <a:t>. </a:t>
+            </a:r>
+            <a:r>
+              <a:rPr lang="pt-BR" dirty="0" err="1">
+                <a:solidFill>
+                  <a:schemeClr val="bg1"/>
+                </a:solidFill>
+                <a:latin typeface="Arial" panose="020B0604020202020204" pitchFamily="34" charset="0"/>
+                <a:cs typeface="Arial" panose="020B0604020202020204" pitchFamily="34" charset="0"/>
+              </a:rPr>
+              <a:t>Curabitur</a:t>
+            </a:r>
+            <a:r>
+              <a:rPr lang="pt-BR" dirty="0">
+                <a:solidFill>
+                  <a:schemeClr val="bg1"/>
+                </a:solidFill>
+                <a:latin typeface="Arial" panose="020B0604020202020204" pitchFamily="34" charset="0"/>
+                <a:cs typeface="Arial" panose="020B0604020202020204" pitchFamily="34" charset="0"/>
+              </a:rPr>
+              <a:t> </a:t>
+            </a:r>
+            <a:r>
+              <a:rPr lang="pt-BR" dirty="0" err="1">
+                <a:solidFill>
+                  <a:schemeClr val="bg1"/>
+                </a:solidFill>
+                <a:latin typeface="Arial" panose="020B0604020202020204" pitchFamily="34" charset="0"/>
+                <a:cs typeface="Arial" panose="020B0604020202020204" pitchFamily="34" charset="0"/>
+              </a:rPr>
+              <a:t>blandit</a:t>
+            </a:r>
+            <a:r>
+              <a:rPr lang="pt-BR" dirty="0">
+                <a:solidFill>
+                  <a:schemeClr val="bg1"/>
+                </a:solidFill>
+                <a:latin typeface="Arial" panose="020B0604020202020204" pitchFamily="34" charset="0"/>
+                <a:cs typeface="Arial" panose="020B0604020202020204" pitchFamily="34" charset="0"/>
+              </a:rPr>
+              <a:t>, </a:t>
+            </a:r>
+            <a:r>
+              <a:rPr lang="pt-BR" dirty="0" err="1">
+                <a:solidFill>
+                  <a:schemeClr val="bg1"/>
+                </a:solidFill>
+                <a:latin typeface="Arial" panose="020B0604020202020204" pitchFamily="34" charset="0"/>
+                <a:cs typeface="Arial" panose="020B0604020202020204" pitchFamily="34" charset="0"/>
+              </a:rPr>
+              <a:t>dolor</a:t>
+            </a:r>
+            <a:r>
+              <a:rPr lang="pt-BR" dirty="0">
+                <a:solidFill>
+                  <a:schemeClr val="bg1"/>
+                </a:solidFill>
+                <a:latin typeface="Arial" panose="020B0604020202020204" pitchFamily="34" charset="0"/>
+                <a:cs typeface="Arial" panose="020B0604020202020204" pitchFamily="34" charset="0"/>
+              </a:rPr>
+              <a:t> a </a:t>
+            </a:r>
+            <a:r>
+              <a:rPr lang="pt-BR" dirty="0" err="1">
+                <a:solidFill>
+                  <a:schemeClr val="bg1"/>
+                </a:solidFill>
+                <a:latin typeface="Arial" panose="020B0604020202020204" pitchFamily="34" charset="0"/>
+                <a:cs typeface="Arial" panose="020B0604020202020204" pitchFamily="34" charset="0"/>
+              </a:rPr>
+              <a:t>hendrerit</a:t>
+            </a:r>
+            <a:r>
+              <a:rPr lang="pt-BR" dirty="0">
+                <a:solidFill>
+                  <a:schemeClr val="bg1"/>
+                </a:solidFill>
+                <a:latin typeface="Arial" panose="020B0604020202020204" pitchFamily="34" charset="0"/>
+                <a:cs typeface="Arial" panose="020B0604020202020204" pitchFamily="34" charset="0"/>
+              </a:rPr>
+              <a:t> </a:t>
+            </a:r>
+            <a:r>
+              <a:rPr lang="pt-BR" dirty="0" err="1">
+                <a:solidFill>
+                  <a:schemeClr val="bg1"/>
+                </a:solidFill>
+                <a:latin typeface="Arial" panose="020B0604020202020204" pitchFamily="34" charset="0"/>
+                <a:cs typeface="Arial" panose="020B0604020202020204" pitchFamily="34" charset="0"/>
+              </a:rPr>
+              <a:t>luctus</a:t>
+            </a:r>
+            <a:r>
+              <a:rPr lang="pt-BR" dirty="0">
+                <a:solidFill>
+                  <a:schemeClr val="bg1"/>
+                </a:solidFill>
+                <a:latin typeface="Arial" panose="020B0604020202020204" pitchFamily="34" charset="0"/>
+                <a:cs typeface="Arial" panose="020B0604020202020204" pitchFamily="34" charset="0"/>
+              </a:rPr>
+              <a:t>, </a:t>
+            </a:r>
+            <a:r>
+              <a:rPr lang="pt-BR" dirty="0" err="1">
+                <a:solidFill>
+                  <a:schemeClr val="bg1"/>
+                </a:solidFill>
+                <a:latin typeface="Arial" panose="020B0604020202020204" pitchFamily="34" charset="0"/>
+                <a:cs typeface="Arial" panose="020B0604020202020204" pitchFamily="34" charset="0"/>
+              </a:rPr>
+              <a:t>lectus</a:t>
+            </a:r>
+            <a:r>
+              <a:rPr lang="pt-BR" dirty="0">
+                <a:solidFill>
+                  <a:schemeClr val="bg1"/>
+                </a:solidFill>
+                <a:latin typeface="Arial" panose="020B0604020202020204" pitchFamily="34" charset="0"/>
+                <a:cs typeface="Arial" panose="020B0604020202020204" pitchFamily="34" charset="0"/>
+              </a:rPr>
+              <a:t> ante </a:t>
+            </a:r>
+            <a:r>
+              <a:rPr lang="pt-BR" dirty="0" err="1">
+                <a:solidFill>
+                  <a:schemeClr val="bg1"/>
+                </a:solidFill>
+                <a:latin typeface="Arial" panose="020B0604020202020204" pitchFamily="34" charset="0"/>
+                <a:cs typeface="Arial" panose="020B0604020202020204" pitchFamily="34" charset="0"/>
+              </a:rPr>
+              <a:t>venenatis</a:t>
+            </a:r>
+            <a:r>
+              <a:rPr lang="pt-BR" dirty="0">
+                <a:solidFill>
+                  <a:schemeClr val="bg1"/>
+                </a:solidFill>
+                <a:latin typeface="Arial" panose="020B0604020202020204" pitchFamily="34" charset="0"/>
+                <a:cs typeface="Arial" panose="020B0604020202020204" pitchFamily="34" charset="0"/>
+              </a:rPr>
+              <a:t> </a:t>
+            </a:r>
+            <a:r>
+              <a:rPr lang="pt-BR" dirty="0" err="1">
+                <a:solidFill>
+                  <a:schemeClr val="bg1"/>
+                </a:solidFill>
+                <a:latin typeface="Arial" panose="020B0604020202020204" pitchFamily="34" charset="0"/>
+                <a:cs typeface="Arial" panose="020B0604020202020204" pitchFamily="34" charset="0"/>
+              </a:rPr>
+              <a:t>ex</a:t>
+            </a:r>
+            <a:r>
+              <a:rPr lang="pt-BR" dirty="0">
+                <a:solidFill>
+                  <a:schemeClr val="bg1"/>
+                </a:solidFill>
+                <a:latin typeface="Arial" panose="020B0604020202020204" pitchFamily="34" charset="0"/>
+                <a:cs typeface="Arial" panose="020B0604020202020204" pitchFamily="34" charset="0"/>
+              </a:rPr>
+              <a:t>, in </a:t>
+            </a:r>
+            <a:r>
+              <a:rPr lang="pt-BR" dirty="0" err="1">
+                <a:solidFill>
+                  <a:schemeClr val="bg1"/>
+                </a:solidFill>
+                <a:latin typeface="Arial" panose="020B0604020202020204" pitchFamily="34" charset="0"/>
+                <a:cs typeface="Arial" panose="020B0604020202020204" pitchFamily="34" charset="0"/>
+              </a:rPr>
+              <a:t>porttitor</a:t>
+            </a:r>
+            <a:r>
+              <a:rPr lang="pt-BR" dirty="0">
+                <a:solidFill>
+                  <a:schemeClr val="bg1"/>
+                </a:solidFill>
+                <a:latin typeface="Arial" panose="020B0604020202020204" pitchFamily="34" charset="0"/>
+                <a:cs typeface="Arial" panose="020B0604020202020204" pitchFamily="34" charset="0"/>
+              </a:rPr>
+              <a:t> </a:t>
+            </a:r>
+            <a:r>
+              <a:rPr lang="pt-BR" dirty="0" err="1">
+                <a:solidFill>
+                  <a:schemeClr val="bg1"/>
+                </a:solidFill>
+                <a:latin typeface="Arial" panose="020B0604020202020204" pitchFamily="34" charset="0"/>
+                <a:cs typeface="Arial" panose="020B0604020202020204" pitchFamily="34" charset="0"/>
+              </a:rPr>
+              <a:t>neque</a:t>
+            </a:r>
+            <a:r>
+              <a:rPr lang="pt-BR" dirty="0">
+                <a:solidFill>
+                  <a:schemeClr val="bg1"/>
+                </a:solidFill>
+                <a:latin typeface="Arial" panose="020B0604020202020204" pitchFamily="34" charset="0"/>
+                <a:cs typeface="Arial" panose="020B0604020202020204" pitchFamily="34" charset="0"/>
+              </a:rPr>
+              <a:t> </a:t>
+            </a:r>
+            <a:r>
+              <a:rPr lang="pt-BR" dirty="0" err="1">
+                <a:solidFill>
+                  <a:schemeClr val="bg1"/>
+                </a:solidFill>
+                <a:latin typeface="Arial" panose="020B0604020202020204" pitchFamily="34" charset="0"/>
+                <a:cs typeface="Arial" panose="020B0604020202020204" pitchFamily="34" charset="0"/>
+              </a:rPr>
+              <a:t>ligula</a:t>
+            </a:r>
+            <a:r>
+              <a:rPr lang="pt-BR" dirty="0">
+                <a:solidFill>
+                  <a:schemeClr val="bg1"/>
+                </a:solidFill>
+                <a:latin typeface="Arial" panose="020B0604020202020204" pitchFamily="34" charset="0"/>
+                <a:cs typeface="Arial" panose="020B0604020202020204" pitchFamily="34" charset="0"/>
+              </a:rPr>
+              <a:t> </a:t>
+            </a:r>
+            <a:r>
+              <a:rPr lang="pt-BR" dirty="0" err="1">
+                <a:solidFill>
+                  <a:schemeClr val="bg1"/>
+                </a:solidFill>
+                <a:latin typeface="Arial" panose="020B0604020202020204" pitchFamily="34" charset="0"/>
+                <a:cs typeface="Arial" panose="020B0604020202020204" pitchFamily="34" charset="0"/>
+              </a:rPr>
+              <a:t>sit</a:t>
+            </a:r>
+            <a:r>
+              <a:rPr lang="pt-BR" dirty="0">
+                <a:solidFill>
+                  <a:schemeClr val="bg1"/>
+                </a:solidFill>
+                <a:latin typeface="Arial" panose="020B0604020202020204" pitchFamily="34" charset="0"/>
+                <a:cs typeface="Arial" panose="020B0604020202020204" pitchFamily="34" charset="0"/>
+              </a:rPr>
+              <a:t> </a:t>
+            </a:r>
+            <a:r>
+              <a:rPr lang="pt-BR" dirty="0" err="1">
+                <a:solidFill>
+                  <a:schemeClr val="bg1"/>
+                </a:solidFill>
+                <a:latin typeface="Arial" panose="020B0604020202020204" pitchFamily="34" charset="0"/>
+                <a:cs typeface="Arial" panose="020B0604020202020204" pitchFamily="34" charset="0"/>
+              </a:rPr>
+              <a:t>amet</a:t>
+            </a:r>
+            <a:r>
+              <a:rPr lang="pt-BR" dirty="0">
+                <a:solidFill>
+                  <a:schemeClr val="bg1"/>
+                </a:solidFill>
+                <a:latin typeface="Arial" panose="020B0604020202020204" pitchFamily="34" charset="0"/>
+                <a:cs typeface="Arial" panose="020B0604020202020204" pitchFamily="34" charset="0"/>
+              </a:rPr>
+              <a:t> </a:t>
+            </a:r>
+            <a:r>
+              <a:rPr lang="pt-BR" dirty="0" err="1">
+                <a:solidFill>
+                  <a:schemeClr val="bg1"/>
+                </a:solidFill>
+                <a:latin typeface="Arial" panose="020B0604020202020204" pitchFamily="34" charset="0"/>
+                <a:cs typeface="Arial" panose="020B0604020202020204" pitchFamily="34" charset="0"/>
+              </a:rPr>
+              <a:t>neque</a:t>
+            </a:r>
+            <a:r>
+              <a:rPr lang="pt-BR" dirty="0">
+                <a:solidFill>
+                  <a:schemeClr val="bg1"/>
+                </a:solidFill>
+                <a:latin typeface="Arial" panose="020B0604020202020204" pitchFamily="34" charset="0"/>
+                <a:cs typeface="Arial" panose="020B0604020202020204" pitchFamily="34" charset="0"/>
+              </a:rPr>
+              <a:t>. </a:t>
+            </a:r>
+            <a:r>
+              <a:rPr lang="pt-BR" dirty="0" err="1">
+                <a:solidFill>
+                  <a:schemeClr val="bg1"/>
+                </a:solidFill>
+                <a:latin typeface="Arial" panose="020B0604020202020204" pitchFamily="34" charset="0"/>
+                <a:cs typeface="Arial" panose="020B0604020202020204" pitchFamily="34" charset="0"/>
+              </a:rPr>
+              <a:t>Proin</a:t>
+            </a:r>
+            <a:r>
+              <a:rPr lang="pt-BR" dirty="0">
+                <a:solidFill>
+                  <a:schemeClr val="bg1"/>
+                </a:solidFill>
+                <a:latin typeface="Arial" panose="020B0604020202020204" pitchFamily="34" charset="0"/>
+                <a:cs typeface="Arial" panose="020B0604020202020204" pitchFamily="34" charset="0"/>
+              </a:rPr>
+              <a:t> </a:t>
+            </a:r>
+            <a:r>
+              <a:rPr lang="pt-BR" dirty="0" err="1">
+                <a:solidFill>
+                  <a:schemeClr val="bg1"/>
+                </a:solidFill>
+                <a:latin typeface="Arial" panose="020B0604020202020204" pitchFamily="34" charset="0"/>
+                <a:cs typeface="Arial" panose="020B0604020202020204" pitchFamily="34" charset="0"/>
+              </a:rPr>
+              <a:t>ultrices</a:t>
+            </a:r>
+            <a:r>
+              <a:rPr lang="pt-BR" dirty="0">
+                <a:solidFill>
+                  <a:schemeClr val="bg1"/>
+                </a:solidFill>
+                <a:latin typeface="Arial" panose="020B0604020202020204" pitchFamily="34" charset="0"/>
+                <a:cs typeface="Arial" panose="020B0604020202020204" pitchFamily="34" charset="0"/>
+              </a:rPr>
+              <a:t> </a:t>
+            </a:r>
+            <a:r>
+              <a:rPr lang="pt-BR" dirty="0" err="1">
+                <a:solidFill>
+                  <a:schemeClr val="bg1"/>
+                </a:solidFill>
+                <a:latin typeface="Arial" panose="020B0604020202020204" pitchFamily="34" charset="0"/>
+                <a:cs typeface="Arial" panose="020B0604020202020204" pitchFamily="34" charset="0"/>
+              </a:rPr>
+              <a:t>lectus</a:t>
+            </a:r>
+            <a:r>
+              <a:rPr lang="pt-BR" dirty="0">
+                <a:solidFill>
+                  <a:schemeClr val="bg1"/>
+                </a:solidFill>
+                <a:latin typeface="Arial" panose="020B0604020202020204" pitchFamily="34" charset="0"/>
+                <a:cs typeface="Arial" panose="020B0604020202020204" pitchFamily="34" charset="0"/>
+              </a:rPr>
+              <a:t> et </a:t>
+            </a:r>
+            <a:r>
+              <a:rPr lang="pt-BR" dirty="0" err="1">
+                <a:solidFill>
+                  <a:schemeClr val="bg1"/>
+                </a:solidFill>
+                <a:latin typeface="Arial" panose="020B0604020202020204" pitchFamily="34" charset="0"/>
+                <a:cs typeface="Arial" panose="020B0604020202020204" pitchFamily="34" charset="0"/>
+              </a:rPr>
+              <a:t>posuere</a:t>
+            </a:r>
+            <a:r>
+              <a:rPr lang="pt-BR" dirty="0">
+                <a:solidFill>
+                  <a:schemeClr val="bg1"/>
+                </a:solidFill>
+                <a:latin typeface="Arial" panose="020B0604020202020204" pitchFamily="34" charset="0"/>
+                <a:cs typeface="Arial" panose="020B0604020202020204" pitchFamily="34" charset="0"/>
+              </a:rPr>
+              <a:t> </a:t>
+            </a:r>
+            <a:r>
+              <a:rPr lang="pt-BR" dirty="0" err="1">
+                <a:solidFill>
+                  <a:schemeClr val="bg1"/>
+                </a:solidFill>
+                <a:latin typeface="Arial" panose="020B0604020202020204" pitchFamily="34" charset="0"/>
+                <a:cs typeface="Arial" panose="020B0604020202020204" pitchFamily="34" charset="0"/>
+              </a:rPr>
+              <a:t>facilisis</a:t>
+            </a:r>
+            <a:r>
+              <a:rPr lang="pt-BR" dirty="0">
+                <a:solidFill>
+                  <a:schemeClr val="bg1"/>
+                </a:solidFill>
+                <a:latin typeface="Arial" panose="020B0604020202020204" pitchFamily="34" charset="0"/>
+                <a:cs typeface="Arial" panose="020B0604020202020204" pitchFamily="34" charset="0"/>
+              </a:rPr>
+              <a:t>. </a:t>
+            </a:r>
+            <a:r>
+              <a:rPr lang="pt-BR" dirty="0" err="1">
+                <a:solidFill>
+                  <a:schemeClr val="bg1"/>
+                </a:solidFill>
+                <a:latin typeface="Arial" panose="020B0604020202020204" pitchFamily="34" charset="0"/>
+                <a:cs typeface="Arial" panose="020B0604020202020204" pitchFamily="34" charset="0"/>
+              </a:rPr>
+              <a:t>Proin</a:t>
+            </a:r>
+            <a:r>
+              <a:rPr lang="pt-BR" dirty="0">
+                <a:solidFill>
+                  <a:schemeClr val="bg1"/>
+                </a:solidFill>
+                <a:latin typeface="Arial" panose="020B0604020202020204" pitchFamily="34" charset="0"/>
+                <a:cs typeface="Arial" panose="020B0604020202020204" pitchFamily="34" charset="0"/>
+              </a:rPr>
+              <a:t> a </a:t>
+            </a:r>
+            <a:r>
+              <a:rPr lang="pt-BR" dirty="0" err="1">
+                <a:solidFill>
+                  <a:schemeClr val="bg1"/>
+                </a:solidFill>
+                <a:latin typeface="Arial" panose="020B0604020202020204" pitchFamily="34" charset="0"/>
+                <a:cs typeface="Arial" panose="020B0604020202020204" pitchFamily="34" charset="0"/>
+              </a:rPr>
+              <a:t>fringilla</a:t>
+            </a:r>
+            <a:r>
+              <a:rPr lang="pt-BR" dirty="0">
+                <a:solidFill>
+                  <a:schemeClr val="bg1"/>
+                </a:solidFill>
+                <a:latin typeface="Arial" panose="020B0604020202020204" pitchFamily="34" charset="0"/>
+                <a:cs typeface="Arial" panose="020B0604020202020204" pitchFamily="34" charset="0"/>
+              </a:rPr>
+              <a:t> </a:t>
+            </a:r>
+            <a:r>
+              <a:rPr lang="pt-BR" dirty="0" err="1">
+                <a:solidFill>
+                  <a:schemeClr val="bg1"/>
+                </a:solidFill>
+                <a:latin typeface="Arial" panose="020B0604020202020204" pitchFamily="34" charset="0"/>
+                <a:cs typeface="Arial" panose="020B0604020202020204" pitchFamily="34" charset="0"/>
+              </a:rPr>
+              <a:t>metus</a:t>
+            </a:r>
+            <a:r>
+              <a:rPr lang="pt-BR" dirty="0">
+                <a:solidFill>
+                  <a:schemeClr val="bg1"/>
+                </a:solidFill>
+                <a:latin typeface="Arial" panose="020B0604020202020204" pitchFamily="34" charset="0"/>
+                <a:cs typeface="Arial" panose="020B0604020202020204" pitchFamily="34" charset="0"/>
+              </a:rPr>
+              <a:t>, ac </a:t>
+            </a:r>
+            <a:r>
+              <a:rPr lang="pt-BR" dirty="0" err="1">
+                <a:solidFill>
+                  <a:schemeClr val="bg1"/>
+                </a:solidFill>
+                <a:latin typeface="Arial" panose="020B0604020202020204" pitchFamily="34" charset="0"/>
+                <a:cs typeface="Arial" panose="020B0604020202020204" pitchFamily="34" charset="0"/>
+              </a:rPr>
+              <a:t>vehicula</a:t>
+            </a:r>
+            <a:r>
+              <a:rPr lang="pt-BR" dirty="0">
+                <a:solidFill>
+                  <a:schemeClr val="bg1"/>
+                </a:solidFill>
+                <a:latin typeface="Arial" panose="020B0604020202020204" pitchFamily="34" charset="0"/>
+                <a:cs typeface="Arial" panose="020B0604020202020204" pitchFamily="34" charset="0"/>
+              </a:rPr>
+              <a:t> </a:t>
+            </a:r>
+            <a:r>
+              <a:rPr lang="pt-BR" dirty="0" err="1">
+                <a:solidFill>
+                  <a:schemeClr val="bg1"/>
+                </a:solidFill>
+                <a:latin typeface="Arial" panose="020B0604020202020204" pitchFamily="34" charset="0"/>
+                <a:cs typeface="Arial" panose="020B0604020202020204" pitchFamily="34" charset="0"/>
+              </a:rPr>
+              <a:t>ligula</a:t>
+            </a:r>
+            <a:r>
+              <a:rPr lang="pt-BR" dirty="0">
+                <a:solidFill>
+                  <a:schemeClr val="bg1"/>
+                </a:solidFill>
+                <a:latin typeface="Arial" panose="020B0604020202020204" pitchFamily="34" charset="0"/>
+                <a:cs typeface="Arial" panose="020B0604020202020204" pitchFamily="34" charset="0"/>
+              </a:rPr>
+              <a:t>. </a:t>
+            </a:r>
+            <a:r>
+              <a:rPr lang="pt-BR" dirty="0" err="1">
+                <a:solidFill>
+                  <a:schemeClr val="bg1"/>
+                </a:solidFill>
+                <a:latin typeface="Arial" panose="020B0604020202020204" pitchFamily="34" charset="0"/>
+                <a:cs typeface="Arial" panose="020B0604020202020204" pitchFamily="34" charset="0"/>
+              </a:rPr>
+              <a:t>Integer</a:t>
+            </a:r>
+            <a:r>
+              <a:rPr lang="pt-BR" dirty="0">
+                <a:solidFill>
+                  <a:schemeClr val="bg1"/>
+                </a:solidFill>
+                <a:latin typeface="Arial" panose="020B0604020202020204" pitchFamily="34" charset="0"/>
+                <a:cs typeface="Arial" panose="020B0604020202020204" pitchFamily="34" charset="0"/>
+              </a:rPr>
+              <a:t> </a:t>
+            </a:r>
+            <a:r>
+              <a:rPr lang="pt-BR" dirty="0" err="1">
+                <a:solidFill>
+                  <a:schemeClr val="bg1"/>
+                </a:solidFill>
+                <a:latin typeface="Arial" panose="020B0604020202020204" pitchFamily="34" charset="0"/>
+                <a:cs typeface="Arial" panose="020B0604020202020204" pitchFamily="34" charset="0"/>
+              </a:rPr>
+              <a:t>congue</a:t>
+            </a:r>
+            <a:r>
+              <a:rPr lang="pt-BR" dirty="0">
+                <a:solidFill>
+                  <a:schemeClr val="bg1"/>
+                </a:solidFill>
+                <a:latin typeface="Arial" panose="020B0604020202020204" pitchFamily="34" charset="0"/>
+                <a:cs typeface="Arial" panose="020B0604020202020204" pitchFamily="34" charset="0"/>
+              </a:rPr>
+              <a:t> </a:t>
+            </a:r>
+            <a:r>
+              <a:rPr lang="pt-BR" dirty="0" err="1">
+                <a:solidFill>
+                  <a:schemeClr val="bg1"/>
+                </a:solidFill>
+                <a:latin typeface="Arial" panose="020B0604020202020204" pitchFamily="34" charset="0"/>
+                <a:cs typeface="Arial" panose="020B0604020202020204" pitchFamily="34" charset="0"/>
+              </a:rPr>
+              <a:t>diam</a:t>
+            </a:r>
+            <a:r>
+              <a:rPr lang="pt-BR" dirty="0">
+                <a:solidFill>
+                  <a:schemeClr val="bg1"/>
+                </a:solidFill>
+                <a:latin typeface="Arial" panose="020B0604020202020204" pitchFamily="34" charset="0"/>
+                <a:cs typeface="Arial" panose="020B0604020202020204" pitchFamily="34" charset="0"/>
+              </a:rPr>
+              <a:t> </a:t>
+            </a:r>
+            <a:r>
+              <a:rPr lang="pt-BR" dirty="0" err="1">
+                <a:solidFill>
+                  <a:schemeClr val="bg1"/>
+                </a:solidFill>
+                <a:latin typeface="Arial" panose="020B0604020202020204" pitchFamily="34" charset="0"/>
+                <a:cs typeface="Arial" panose="020B0604020202020204" pitchFamily="34" charset="0"/>
+              </a:rPr>
+              <a:t>neque</a:t>
+            </a:r>
+            <a:r>
+              <a:rPr lang="pt-BR" dirty="0">
+                <a:solidFill>
+                  <a:schemeClr val="bg1"/>
+                </a:solidFill>
+                <a:latin typeface="Arial" panose="020B0604020202020204" pitchFamily="34" charset="0"/>
+                <a:cs typeface="Arial" panose="020B0604020202020204" pitchFamily="34" charset="0"/>
+              </a:rPr>
+              <a:t>, vitae </a:t>
+            </a:r>
+            <a:r>
+              <a:rPr lang="pt-BR" dirty="0" err="1">
+                <a:solidFill>
+                  <a:schemeClr val="bg1"/>
+                </a:solidFill>
+                <a:latin typeface="Arial" panose="020B0604020202020204" pitchFamily="34" charset="0"/>
+                <a:cs typeface="Arial" panose="020B0604020202020204" pitchFamily="34" charset="0"/>
+              </a:rPr>
+              <a:t>viverra</a:t>
+            </a:r>
+            <a:r>
+              <a:rPr lang="pt-BR" dirty="0">
+                <a:solidFill>
+                  <a:schemeClr val="bg1"/>
+                </a:solidFill>
+                <a:latin typeface="Arial" panose="020B0604020202020204" pitchFamily="34" charset="0"/>
+                <a:cs typeface="Arial" panose="020B0604020202020204" pitchFamily="34" charset="0"/>
+              </a:rPr>
+              <a:t> </a:t>
+            </a:r>
+            <a:r>
+              <a:rPr lang="pt-BR" dirty="0" err="1">
+                <a:solidFill>
+                  <a:schemeClr val="bg1"/>
+                </a:solidFill>
+                <a:latin typeface="Arial" panose="020B0604020202020204" pitchFamily="34" charset="0"/>
+                <a:cs typeface="Arial" panose="020B0604020202020204" pitchFamily="34" charset="0"/>
+              </a:rPr>
+              <a:t>arcu</a:t>
+            </a:r>
+            <a:r>
+              <a:rPr lang="pt-BR" dirty="0">
+                <a:solidFill>
+                  <a:schemeClr val="bg1"/>
+                </a:solidFill>
+                <a:latin typeface="Arial" panose="020B0604020202020204" pitchFamily="34" charset="0"/>
+                <a:cs typeface="Arial" panose="020B0604020202020204" pitchFamily="34" charset="0"/>
+              </a:rPr>
+              <a:t> </a:t>
+            </a:r>
+            <a:r>
+              <a:rPr lang="pt-BR" dirty="0" err="1">
+                <a:solidFill>
+                  <a:schemeClr val="bg1"/>
+                </a:solidFill>
+                <a:latin typeface="Arial" panose="020B0604020202020204" pitchFamily="34" charset="0"/>
+                <a:cs typeface="Arial" panose="020B0604020202020204" pitchFamily="34" charset="0"/>
+              </a:rPr>
+              <a:t>iaculis</a:t>
+            </a:r>
+            <a:r>
+              <a:rPr lang="pt-BR" dirty="0">
+                <a:solidFill>
+                  <a:schemeClr val="bg1"/>
+                </a:solidFill>
+                <a:latin typeface="Arial" panose="020B0604020202020204" pitchFamily="34" charset="0"/>
+                <a:cs typeface="Arial" panose="020B0604020202020204" pitchFamily="34" charset="0"/>
+              </a:rPr>
+              <a:t> </a:t>
+            </a:r>
+            <a:r>
+              <a:rPr lang="pt-BR" dirty="0" err="1">
+                <a:solidFill>
+                  <a:schemeClr val="bg1"/>
+                </a:solidFill>
+                <a:latin typeface="Arial" panose="020B0604020202020204" pitchFamily="34" charset="0"/>
+                <a:cs typeface="Arial" panose="020B0604020202020204" pitchFamily="34" charset="0"/>
+              </a:rPr>
+              <a:t>suscipit</a:t>
+            </a:r>
+            <a:r>
+              <a:rPr lang="pt-BR" dirty="0">
+                <a:solidFill>
+                  <a:schemeClr val="bg1"/>
+                </a:solidFill>
+                <a:latin typeface="Arial" panose="020B0604020202020204" pitchFamily="34" charset="0"/>
+                <a:cs typeface="Arial" panose="020B0604020202020204" pitchFamily="34" charset="0"/>
+              </a:rPr>
+              <a:t>. </a:t>
+            </a:r>
+            <a:r>
+              <a:rPr lang="pt-BR" dirty="0" err="1">
+                <a:solidFill>
+                  <a:schemeClr val="bg1"/>
+                </a:solidFill>
+                <a:latin typeface="Arial" panose="020B0604020202020204" pitchFamily="34" charset="0"/>
+                <a:cs typeface="Arial" panose="020B0604020202020204" pitchFamily="34" charset="0"/>
+              </a:rPr>
+              <a:t>Proin</a:t>
+            </a:r>
+            <a:r>
+              <a:rPr lang="pt-BR" dirty="0">
+                <a:solidFill>
+                  <a:schemeClr val="bg1"/>
+                </a:solidFill>
+                <a:latin typeface="Arial" panose="020B0604020202020204" pitchFamily="34" charset="0"/>
+                <a:cs typeface="Arial" panose="020B0604020202020204" pitchFamily="34" charset="0"/>
+              </a:rPr>
+              <a:t> </a:t>
+            </a:r>
+            <a:r>
+              <a:rPr lang="pt-BR" dirty="0" err="1">
+                <a:solidFill>
+                  <a:schemeClr val="bg1"/>
+                </a:solidFill>
+                <a:latin typeface="Arial" panose="020B0604020202020204" pitchFamily="34" charset="0"/>
+                <a:cs typeface="Arial" panose="020B0604020202020204" pitchFamily="34" charset="0"/>
+              </a:rPr>
+              <a:t>volutpat</a:t>
+            </a:r>
+            <a:r>
+              <a:rPr lang="pt-BR" dirty="0">
+                <a:solidFill>
+                  <a:schemeClr val="bg1"/>
+                </a:solidFill>
+                <a:latin typeface="Arial" panose="020B0604020202020204" pitchFamily="34" charset="0"/>
+                <a:cs typeface="Arial" panose="020B0604020202020204" pitchFamily="34" charset="0"/>
+              </a:rPr>
+              <a:t> </a:t>
+            </a:r>
+            <a:r>
+              <a:rPr lang="pt-BR" dirty="0" err="1">
+                <a:solidFill>
+                  <a:schemeClr val="bg1"/>
+                </a:solidFill>
+                <a:latin typeface="Arial" panose="020B0604020202020204" pitchFamily="34" charset="0"/>
+                <a:cs typeface="Arial" panose="020B0604020202020204" pitchFamily="34" charset="0"/>
+              </a:rPr>
+              <a:t>condimentum</a:t>
+            </a:r>
+            <a:r>
+              <a:rPr lang="pt-BR" dirty="0">
+                <a:solidFill>
+                  <a:schemeClr val="bg1"/>
+                </a:solidFill>
+                <a:latin typeface="Arial" panose="020B0604020202020204" pitchFamily="34" charset="0"/>
+                <a:cs typeface="Arial" panose="020B0604020202020204" pitchFamily="34" charset="0"/>
+              </a:rPr>
+              <a:t> </a:t>
+            </a:r>
+            <a:r>
+              <a:rPr lang="pt-BR" dirty="0" err="1">
+                <a:solidFill>
+                  <a:schemeClr val="bg1"/>
+                </a:solidFill>
+                <a:latin typeface="Arial" panose="020B0604020202020204" pitchFamily="34" charset="0"/>
+                <a:cs typeface="Arial" panose="020B0604020202020204" pitchFamily="34" charset="0"/>
+              </a:rPr>
+              <a:t>felis</a:t>
+            </a:r>
+            <a:r>
+              <a:rPr lang="pt-BR" dirty="0">
+                <a:solidFill>
+                  <a:schemeClr val="bg1"/>
+                </a:solidFill>
+                <a:latin typeface="Arial" panose="020B0604020202020204" pitchFamily="34" charset="0"/>
+                <a:cs typeface="Arial" panose="020B0604020202020204" pitchFamily="34" charset="0"/>
+              </a:rPr>
+              <a:t> ut </a:t>
+            </a:r>
+            <a:r>
+              <a:rPr lang="pt-BR" dirty="0" err="1">
+                <a:solidFill>
+                  <a:schemeClr val="bg1"/>
+                </a:solidFill>
+                <a:latin typeface="Arial" panose="020B0604020202020204" pitchFamily="34" charset="0"/>
+                <a:cs typeface="Arial" panose="020B0604020202020204" pitchFamily="34" charset="0"/>
+              </a:rPr>
+              <a:t>fermentum</a:t>
+            </a:r>
+            <a:r>
+              <a:rPr lang="pt-BR" dirty="0">
+                <a:solidFill>
+                  <a:schemeClr val="bg1"/>
+                </a:solidFill>
+                <a:latin typeface="Arial" panose="020B0604020202020204" pitchFamily="34" charset="0"/>
+                <a:cs typeface="Arial" panose="020B0604020202020204" pitchFamily="34" charset="0"/>
+              </a:rPr>
+              <a:t>. </a:t>
+            </a:r>
+          </a:p>
+        </p:txBody>
+      </p:sp>
+      <p:pic>
+        <p:nvPicPr>
+          <p:cNvPr id="2052" name="Picture 4" descr="Startup de Energia Solar Ajuda Impulsionar a Tecnologia">
+            <a:extLst>
+              <a:ext uri="{FF2B5EF4-FFF2-40B4-BE49-F238E27FC236}">
+                <a16:creationId xmlns:a16="http://schemas.microsoft.com/office/drawing/2014/main" id="{6CD7153A-3166-49DF-8D6A-3DC99C10702E}"/>
+              </a:ext>
+            </a:extLst>
+          </p:cNvPr>
+          <p:cNvPicPr>
+            <a:picLocks noChangeAspect="1" noChangeArrowheads="1"/>
+          </p:cNvPicPr>
+          <p:nvPr/>
+        </p:nvPicPr>
+        <p:blipFill>
+          <a:blip r:embed="rId2">
+            <a:extLst>
+              <a:ext uri="{28A0092B-C50C-407E-A947-70E740481C1C}">
+                <a14:useLocalDpi xmlns:a14="http://schemas.microsoft.com/office/drawing/2010/main" val="0"/>
+              </a:ext>
+            </a:extLst>
+          </a:blip>
+          <a:srcRect/>
+          <a:stretch>
+            <a:fillRect/>
+          </a:stretch>
+        </p:blipFill>
+        <p:spPr bwMode="auto">
+          <a:xfrm>
+            <a:off x="1255645" y="977850"/>
+            <a:ext cx="3266659" cy="4808638"/>
+          </a:xfrm>
+          <a:prstGeom prst="rect">
+            <a:avLst/>
+          </a:prstGeom>
+          <a:noFill/>
+          <a:extLst>
+            <a:ext uri="{909E8E84-426E-40DD-AFC4-6F175D3DCCD1}">
+              <a14:hiddenFill xmlns:a14="http://schemas.microsoft.com/office/drawing/2010/main">
+                <a:solidFill>
+                  <a:srgbClr val="FFFFFF"/>
+                </a:solidFill>
+              </a14:hiddenFill>
+            </a:ext>
+          </a:extLst>
+        </p:spPr>
+      </p:pic>
+      <p:cxnSp>
+        <p:nvCxnSpPr>
+          <p:cNvPr id="16" name="Conector reto 15">
+            <a:extLst>
+              <a:ext uri="{FF2B5EF4-FFF2-40B4-BE49-F238E27FC236}">
+                <a16:creationId xmlns:a16="http://schemas.microsoft.com/office/drawing/2014/main" id="{F7FF5952-8E99-49BB-AA87-6F4A0A55A630}"/>
+              </a:ext>
+            </a:extLst>
+          </p:cNvPr>
+          <p:cNvCxnSpPr/>
+          <p:nvPr/>
+        </p:nvCxnSpPr>
+        <p:spPr>
+          <a:xfrm>
+            <a:off x="5049078" y="2879865"/>
+            <a:ext cx="834887" cy="0"/>
+          </a:xfrm>
+          <a:prstGeom prst="line">
+            <a:avLst/>
+          </a:prstGeom>
+          <a:ln w="25400">
+            <a:solidFill>
+              <a:srgbClr val="00B0F0"/>
+            </a:solidFill>
+          </a:ln>
+        </p:spPr>
+        <p:style>
+          <a:lnRef idx="1">
+            <a:schemeClr val="accent1"/>
+          </a:lnRef>
+          <a:fillRef idx="0">
+            <a:schemeClr val="accent1"/>
+          </a:fillRef>
+          <a:effectRef idx="0">
+            <a:schemeClr val="accent1"/>
+          </a:effectRef>
+          <a:fontRef idx="minor">
+            <a:schemeClr val="tx1"/>
+          </a:fontRef>
+        </p:style>
+      </p:cxnSp>
+    </p:spTree>
+    <p:extLst>
+      <p:ext uri="{BB962C8B-B14F-4D97-AF65-F5344CB8AC3E}">
+        <p14:creationId xmlns:p14="http://schemas.microsoft.com/office/powerpoint/2010/main" val="2109539499"/>
       </p:ext>
     </p:extLst>
   </p:cSld>

</xml_diff>